<commit_message>
Android Studio: Ergänzung um Installation des Emulators
</commit_message>
<xml_diff>
--- a/AndroidStudio.pptx
+++ b/AndroidStudio.pptx
@@ -6,10 +6,10 @@
     <p:sldMasterId id="2147483656" r:id="rId2"/>
   </p:sldMasterIdLst>
   <p:notesMasterIdLst>
-    <p:notesMasterId r:id="rId43"/>
+    <p:notesMasterId r:id="rId51"/>
   </p:notesMasterIdLst>
   <p:handoutMasterIdLst>
-    <p:handoutMasterId r:id="rId44"/>
+    <p:handoutMasterId r:id="rId52"/>
   </p:handoutMasterIdLst>
   <p:sldIdLst>
     <p:sldId id="256" r:id="rId3"/>
@@ -49,9 +49,17 @@
     <p:sldId id="290" r:id="rId37"/>
     <p:sldId id="291" r:id="rId38"/>
     <p:sldId id="292" r:id="rId39"/>
-    <p:sldId id="294" r:id="rId40"/>
-    <p:sldId id="258" r:id="rId41"/>
-    <p:sldId id="295" r:id="rId42"/>
+    <p:sldId id="299" r:id="rId40"/>
+    <p:sldId id="300" r:id="rId41"/>
+    <p:sldId id="301" r:id="rId42"/>
+    <p:sldId id="303" r:id="rId43"/>
+    <p:sldId id="304" r:id="rId44"/>
+    <p:sldId id="305" r:id="rId45"/>
+    <p:sldId id="306" r:id="rId46"/>
+    <p:sldId id="307" r:id="rId47"/>
+    <p:sldId id="302" r:id="rId48"/>
+    <p:sldId id="258" r:id="rId49"/>
+    <p:sldId id="295" r:id="rId50"/>
   </p:sldIdLst>
   <p:sldSz cx="12192000" cy="6858000"/>
   <p:notesSz cx="6858000" cy="9144000"/>
@@ -213,14 +221,26 @@
             <p14:sldId id="283"/>
           </p14:sldIdLst>
         </p14:section>
-        <p14:section name="Übungsprojekt" id="{627626BA-C082-4E80-9285-18FD841F463C}">
+        <p14:section name="Demo-App" id="{627626BA-C082-4E80-9285-18FD841F463C}">
           <p14:sldIdLst>
             <p14:sldId id="270"/>
             <p14:sldId id="289"/>
             <p14:sldId id="290"/>
             <p14:sldId id="291"/>
             <p14:sldId id="292"/>
-            <p14:sldId id="294"/>
+          </p14:sldIdLst>
+        </p14:section>
+        <p14:section name="Virtual Device" id="{23C7DAF7-CB9F-437D-90E8-5A9A95A849E8}">
+          <p14:sldIdLst>
+            <p14:sldId id="299"/>
+            <p14:sldId id="300"/>
+            <p14:sldId id="301"/>
+            <p14:sldId id="303"/>
+            <p14:sldId id="304"/>
+            <p14:sldId id="305"/>
+            <p14:sldId id="306"/>
+            <p14:sldId id="307"/>
+            <p14:sldId id="302"/>
           </p14:sldIdLst>
         </p14:section>
         <p14:section name="Zusammenfassung" id="{3935168F-CA97-4DBE-AA4D-CD6487E81BA7}">
@@ -342,7 +362,7 @@
                   <a:schemeClr val="tx2"/>
                 </a:solidFill>
               </a:rPr>
-              <a:t>29.09.2021</a:t>
+              <a:t>30.09.2021</a:t>
             </a:fld>
             <a:endParaRPr lang="de-DE">
               <a:solidFill>
@@ -692,7 +712,7 @@
             <a:fld id="{B4113CCE-1A1A-46DB-884A-AE560F65C3AF}" type="datetimeFigureOut">
               <a:rPr lang="de-DE" smtClean="0"/>
               <a:pPr/>
-              <a:t>29.09.2021</a:t>
+              <a:t>30.09.2021</a:t>
             </a:fld>
             <a:endParaRPr lang="de-DE"/>
           </a:p>
@@ -2567,7 +2587,16 @@
           <a:bodyPr/>
           <a:lstStyle/>
           <a:p>
-            <a:endParaRPr lang="de-DE" dirty="0"/>
+            <a:r>
+              <a:rPr lang="de-DE" dirty="0"/>
+              <a:t>Um unsere App in einer Android-Umgebung zu testen, brauchen wir ein Android Gerät. </a:t>
+            </a:r>
+          </a:p>
+          <a:p>
+            <a:r>
+              <a:rPr lang="de-DE" dirty="0"/>
+              <a:t>Dazu können wir entweder ein echtes Smartphone mit Entwickler-Freischaltung nutzen, oder einen Emulator (virtuelles Gerät) verwenden.</a:t>
+            </a:r>
           </a:p>
         </p:txBody>
       </p:sp>
@@ -2589,7 +2618,7 @@
             <a:fld id="{927DBD90-B360-417B-B4B3-F05A4AFC1996}" type="slidenum">
               <a:rPr lang="de-DE" smtClean="0"/>
               <a:pPr/>
-              <a:t>39</a:t>
+              <a:t>38</a:t>
             </a:fld>
             <a:endParaRPr lang="de-DE"/>
           </a:p>
@@ -2598,7 +2627,7 @@
     </p:spTree>
     <p:extLst>
       <p:ext uri="{BB962C8B-B14F-4D97-AF65-F5344CB8AC3E}">
-        <p14:creationId xmlns:p14="http://schemas.microsoft.com/office/powerpoint/2010/main" val="1151840123"/>
+        <p14:creationId xmlns:p14="http://schemas.microsoft.com/office/powerpoint/2010/main" val="3089597877"/>
       </p:ext>
     </p:extLst>
   </p:cSld>
@@ -2657,7 +2686,10 @@
           <a:bodyPr/>
           <a:lstStyle/>
           <a:p>
-            <a:endParaRPr lang="de-DE"/>
+            <a:r>
+              <a:rPr lang="de-DE" dirty="0"/>
+              <a:t>Pixel 4, Android 8: 750 MB Download</a:t>
+            </a:r>
           </a:p>
         </p:txBody>
       </p:sp>
@@ -2668,7 +2700,7 @@
             <a:spLocks noGrp="1"/>
           </p:cNvSpPr>
           <p:nvPr>
-            <p:ph type="sldNum" sz="quarter" idx="10"/>
+            <p:ph type="sldNum" sz="quarter" idx="5"/>
           </p:nvPr>
         </p:nvSpPr>
         <p:spPr/>
@@ -2678,7 +2710,430 @@
           <a:p>
             <a:fld id="{927DBD90-B360-417B-B4B3-F05A4AFC1996}" type="slidenum">
               <a:rPr lang="de-DE" smtClean="0"/>
+              <a:pPr/>
+              <a:t>39</a:t>
+            </a:fld>
+            <a:endParaRPr lang="de-DE"/>
+          </a:p>
+        </p:txBody>
+      </p:sp>
+    </p:spTree>
+    <p:extLst>
+      <p:ext uri="{BB962C8B-B14F-4D97-AF65-F5344CB8AC3E}">
+        <p14:creationId xmlns:p14="http://schemas.microsoft.com/office/powerpoint/2010/main" val="3288490188"/>
+      </p:ext>
+    </p:extLst>
+  </p:cSld>
+  <p:clrMapOvr>
+    <a:masterClrMapping/>
+  </p:clrMapOvr>
+</p:notes>
+</file>
+
+<file path=ppt/notesSlides/notesSlide24.xml><?xml version="1.0" encoding="utf-8"?>
+<p:notes xmlns:a="http://schemas.openxmlformats.org/drawingml/2006/main" xmlns:r="http://schemas.openxmlformats.org/officeDocument/2006/relationships" xmlns:p="http://schemas.openxmlformats.org/presentationml/2006/main">
+  <p:cSld>
+    <p:spTree>
+      <p:nvGrpSpPr>
+        <p:cNvPr id="1" name=""/>
+        <p:cNvGrpSpPr/>
+        <p:nvPr/>
+      </p:nvGrpSpPr>
+      <p:grpSpPr>
+        <a:xfrm>
+          <a:off x="0" y="0"/>
+          <a:ext cx="0" cy="0"/>
+          <a:chOff x="0" y="0"/>
+          <a:chExt cx="0" cy="0"/>
+        </a:xfrm>
+      </p:grpSpPr>
+      <p:sp>
+        <p:nvSpPr>
+          <p:cNvPr id="2" name="Folienbildplatzhalter 1"/>
+          <p:cNvSpPr>
+            <a:spLocks noGrp="1" noRot="1" noChangeAspect="1"/>
+          </p:cNvSpPr>
+          <p:nvPr>
+            <p:ph type="sldImg"/>
+          </p:nvPr>
+        </p:nvSpPr>
+        <p:spPr>
+          <a:xfrm>
+            <a:off x="685800" y="1143000"/>
+            <a:ext cx="4270375" cy="2401888"/>
+          </a:xfrm>
+        </p:spPr>
+      </p:sp>
+      <p:sp>
+        <p:nvSpPr>
+          <p:cNvPr id="3" name="Notizenplatzhalter 2"/>
+          <p:cNvSpPr>
+            <a:spLocks noGrp="1"/>
+          </p:cNvSpPr>
+          <p:nvPr>
+            <p:ph type="body" idx="1"/>
+          </p:nvPr>
+        </p:nvSpPr>
+        <p:spPr/>
+        <p:txBody>
+          <a:bodyPr/>
+          <a:lstStyle/>
+          <a:p>
+            <a:r>
+              <a:rPr lang="de-DE" dirty="0"/>
+              <a:t>Mein Smartphone hat Android 8.</a:t>
+            </a:r>
+          </a:p>
+          <a:p>
+            <a:r>
+              <a:rPr lang="de-DE" dirty="0"/>
+              <a:t>Android Version ermitteln: Einstellungen &gt; Telefoninfo &gt; Softwareinfo (je nach Modell unterschiedlich)</a:t>
+            </a:r>
+          </a:p>
+        </p:txBody>
+      </p:sp>
+      <p:sp>
+        <p:nvSpPr>
+          <p:cNvPr id="4" name="Foliennummernplatzhalter 3"/>
+          <p:cNvSpPr>
+            <a:spLocks noGrp="1"/>
+          </p:cNvSpPr>
+          <p:nvPr>
+            <p:ph type="sldNum" sz="quarter" idx="5"/>
+          </p:nvPr>
+        </p:nvSpPr>
+        <p:spPr/>
+        <p:txBody>
+          <a:bodyPr/>
+          <a:lstStyle/>
+          <a:p>
+            <a:fld id="{927DBD90-B360-417B-B4B3-F05A4AFC1996}" type="slidenum">
+              <a:rPr lang="de-DE" smtClean="0"/>
+              <a:pPr/>
               <a:t>40</a:t>
+            </a:fld>
+            <a:endParaRPr lang="de-DE"/>
+          </a:p>
+        </p:txBody>
+      </p:sp>
+    </p:spTree>
+    <p:extLst>
+      <p:ext uri="{BB962C8B-B14F-4D97-AF65-F5344CB8AC3E}">
+        <p14:creationId xmlns:p14="http://schemas.microsoft.com/office/powerpoint/2010/main" val="4112550721"/>
+      </p:ext>
+    </p:extLst>
+  </p:cSld>
+  <p:clrMapOvr>
+    <a:masterClrMapping/>
+  </p:clrMapOvr>
+</p:notes>
+</file>
+
+<file path=ppt/notesSlides/notesSlide25.xml><?xml version="1.0" encoding="utf-8"?>
+<p:notes xmlns:a="http://schemas.openxmlformats.org/drawingml/2006/main" xmlns:r="http://schemas.openxmlformats.org/officeDocument/2006/relationships" xmlns:p="http://schemas.openxmlformats.org/presentationml/2006/main">
+  <p:cSld>
+    <p:spTree>
+      <p:nvGrpSpPr>
+        <p:cNvPr id="1" name=""/>
+        <p:cNvGrpSpPr/>
+        <p:nvPr/>
+      </p:nvGrpSpPr>
+      <p:grpSpPr>
+        <a:xfrm>
+          <a:off x="0" y="0"/>
+          <a:ext cx="0" cy="0"/>
+          <a:chOff x="0" y="0"/>
+          <a:chExt cx="0" cy="0"/>
+        </a:xfrm>
+      </p:grpSpPr>
+      <p:sp>
+        <p:nvSpPr>
+          <p:cNvPr id="2" name="Folienbildplatzhalter 1"/>
+          <p:cNvSpPr>
+            <a:spLocks noGrp="1" noRot="1" noChangeAspect="1"/>
+          </p:cNvSpPr>
+          <p:nvPr>
+            <p:ph type="sldImg"/>
+          </p:nvPr>
+        </p:nvSpPr>
+        <p:spPr>
+          <a:xfrm>
+            <a:off x="685800" y="1143000"/>
+            <a:ext cx="4270375" cy="2401888"/>
+          </a:xfrm>
+        </p:spPr>
+      </p:sp>
+      <p:sp>
+        <p:nvSpPr>
+          <p:cNvPr id="3" name="Notizenplatzhalter 2"/>
+          <p:cNvSpPr>
+            <a:spLocks noGrp="1"/>
+          </p:cNvSpPr>
+          <p:nvPr>
+            <p:ph type="body" idx="1"/>
+          </p:nvPr>
+        </p:nvSpPr>
+        <p:spPr/>
+        <p:txBody>
+          <a:bodyPr/>
+          <a:lstStyle/>
+          <a:p>
+            <a:r>
+              <a:rPr lang="de-DE" dirty="0"/>
+              <a:t>URL: https://dl.google.com/android/repository/sys-img/google_apis_playstore/x86-26_r07.zip     (die 26 sollte vielleicht zum Ordner Android-26 passen?)</a:t>
+            </a:r>
+          </a:p>
+          <a:p>
+            <a:r>
+              <a:rPr lang="de-DE" dirty="0"/>
+              <a:t>Explorer: %</a:t>
+            </a:r>
+            <a:r>
+              <a:rPr lang="de-DE" dirty="0" err="1"/>
+              <a:t>localappdata</a:t>
+            </a:r>
+            <a:r>
+              <a:rPr lang="de-DE" dirty="0"/>
+              <a:t>%</a:t>
+            </a:r>
+          </a:p>
+          <a:p>
+            <a:r>
+              <a:rPr lang="de-DE" dirty="0"/>
+              <a:t>Android\</a:t>
+            </a:r>
+            <a:r>
+              <a:rPr lang="de-DE" dirty="0" err="1"/>
+              <a:t>Sdk</a:t>
+            </a:r>
+            <a:r>
+              <a:rPr lang="de-DE" dirty="0"/>
+              <a:t>\system-images\android-26</a:t>
+            </a:r>
+          </a:p>
+          <a:p>
+            <a:r>
+              <a:rPr lang="de-DE" dirty="0"/>
+              <a:t>Ordner anlegen: </a:t>
+            </a:r>
+            <a:r>
+              <a:rPr lang="de-DE" dirty="0" err="1"/>
+              <a:t>default</a:t>
+            </a:r>
+            <a:endParaRPr lang="de-DE" dirty="0"/>
+          </a:p>
+          <a:p>
+            <a:r>
+              <a:rPr lang="de-DE" dirty="0"/>
+              <a:t>Ordner anlegen: x86_64</a:t>
+            </a:r>
+          </a:p>
+          <a:p>
+            <a:endParaRPr lang="de-DE" dirty="0"/>
+          </a:p>
+          <a:p>
+            <a:endParaRPr lang="de-DE" dirty="0"/>
+          </a:p>
+        </p:txBody>
+      </p:sp>
+      <p:sp>
+        <p:nvSpPr>
+          <p:cNvPr id="4" name="Foliennummernplatzhalter 3"/>
+          <p:cNvSpPr>
+            <a:spLocks noGrp="1"/>
+          </p:cNvSpPr>
+          <p:nvPr>
+            <p:ph type="sldNum" sz="quarter" idx="5"/>
+          </p:nvPr>
+        </p:nvSpPr>
+        <p:spPr/>
+        <p:txBody>
+          <a:bodyPr/>
+          <a:lstStyle/>
+          <a:p>
+            <a:fld id="{927DBD90-B360-417B-B4B3-F05A4AFC1996}" type="slidenum">
+              <a:rPr lang="de-DE" smtClean="0"/>
+              <a:pPr/>
+              <a:t>46</a:t>
+            </a:fld>
+            <a:endParaRPr lang="de-DE"/>
+          </a:p>
+        </p:txBody>
+      </p:sp>
+    </p:spTree>
+    <p:extLst>
+      <p:ext uri="{BB962C8B-B14F-4D97-AF65-F5344CB8AC3E}">
+        <p14:creationId xmlns:p14="http://schemas.microsoft.com/office/powerpoint/2010/main" val="857075771"/>
+      </p:ext>
+    </p:extLst>
+  </p:cSld>
+  <p:clrMapOvr>
+    <a:masterClrMapping/>
+  </p:clrMapOvr>
+</p:notes>
+</file>
+
+<file path=ppt/notesSlides/notesSlide26.xml><?xml version="1.0" encoding="utf-8"?>
+<p:notes xmlns:a="http://schemas.openxmlformats.org/drawingml/2006/main" xmlns:r="http://schemas.openxmlformats.org/officeDocument/2006/relationships" xmlns:p="http://schemas.openxmlformats.org/presentationml/2006/main">
+  <p:cSld>
+    <p:spTree>
+      <p:nvGrpSpPr>
+        <p:cNvPr id="1" name=""/>
+        <p:cNvGrpSpPr/>
+        <p:nvPr/>
+      </p:nvGrpSpPr>
+      <p:grpSpPr>
+        <a:xfrm>
+          <a:off x="0" y="0"/>
+          <a:ext cx="0" cy="0"/>
+          <a:chOff x="0" y="0"/>
+          <a:chExt cx="0" cy="0"/>
+        </a:xfrm>
+      </p:grpSpPr>
+      <p:sp>
+        <p:nvSpPr>
+          <p:cNvPr id="2" name="Folienbildplatzhalter 1"/>
+          <p:cNvSpPr>
+            <a:spLocks noGrp="1" noRot="1" noChangeAspect="1"/>
+          </p:cNvSpPr>
+          <p:nvPr>
+            <p:ph type="sldImg"/>
+          </p:nvPr>
+        </p:nvSpPr>
+        <p:spPr>
+          <a:xfrm>
+            <a:off x="685800" y="1143000"/>
+            <a:ext cx="4270375" cy="2401888"/>
+          </a:xfrm>
+        </p:spPr>
+      </p:sp>
+      <p:sp>
+        <p:nvSpPr>
+          <p:cNvPr id="3" name="Notizenplatzhalter 2"/>
+          <p:cNvSpPr>
+            <a:spLocks noGrp="1"/>
+          </p:cNvSpPr>
+          <p:nvPr>
+            <p:ph type="body" idx="1"/>
+          </p:nvPr>
+        </p:nvSpPr>
+        <p:spPr/>
+        <p:txBody>
+          <a:bodyPr/>
+          <a:lstStyle/>
+          <a:p>
+            <a:endParaRPr lang="de-DE" dirty="0"/>
+          </a:p>
+        </p:txBody>
+      </p:sp>
+      <p:sp>
+        <p:nvSpPr>
+          <p:cNvPr id="4" name="Foliennummernplatzhalter 3"/>
+          <p:cNvSpPr>
+            <a:spLocks noGrp="1"/>
+          </p:cNvSpPr>
+          <p:nvPr>
+            <p:ph type="sldNum" sz="quarter" idx="5"/>
+          </p:nvPr>
+        </p:nvSpPr>
+        <p:spPr/>
+        <p:txBody>
+          <a:bodyPr/>
+          <a:lstStyle/>
+          <a:p>
+            <a:fld id="{927DBD90-B360-417B-B4B3-F05A4AFC1996}" type="slidenum">
+              <a:rPr lang="de-DE" smtClean="0"/>
+              <a:pPr/>
+              <a:t>47</a:t>
+            </a:fld>
+            <a:endParaRPr lang="de-DE"/>
+          </a:p>
+        </p:txBody>
+      </p:sp>
+    </p:spTree>
+    <p:extLst>
+      <p:ext uri="{BB962C8B-B14F-4D97-AF65-F5344CB8AC3E}">
+        <p14:creationId xmlns:p14="http://schemas.microsoft.com/office/powerpoint/2010/main" val="1151840123"/>
+      </p:ext>
+    </p:extLst>
+  </p:cSld>
+  <p:clrMapOvr>
+    <a:masterClrMapping/>
+  </p:clrMapOvr>
+</p:notes>
+</file>
+
+<file path=ppt/notesSlides/notesSlide27.xml><?xml version="1.0" encoding="utf-8"?>
+<p:notes xmlns:a="http://schemas.openxmlformats.org/drawingml/2006/main" xmlns:r="http://schemas.openxmlformats.org/officeDocument/2006/relationships" xmlns:p="http://schemas.openxmlformats.org/presentationml/2006/main">
+  <p:cSld>
+    <p:spTree>
+      <p:nvGrpSpPr>
+        <p:cNvPr id="1" name=""/>
+        <p:cNvGrpSpPr/>
+        <p:nvPr/>
+      </p:nvGrpSpPr>
+      <p:grpSpPr>
+        <a:xfrm>
+          <a:off x="0" y="0"/>
+          <a:ext cx="0" cy="0"/>
+          <a:chOff x="0" y="0"/>
+          <a:chExt cx="0" cy="0"/>
+        </a:xfrm>
+      </p:grpSpPr>
+      <p:sp>
+        <p:nvSpPr>
+          <p:cNvPr id="2" name="Folienbildplatzhalter 1"/>
+          <p:cNvSpPr>
+            <a:spLocks noGrp="1" noRot="1" noChangeAspect="1"/>
+          </p:cNvSpPr>
+          <p:nvPr>
+            <p:ph type="sldImg"/>
+          </p:nvPr>
+        </p:nvSpPr>
+        <p:spPr>
+          <a:xfrm>
+            <a:off x="685800" y="1143000"/>
+            <a:ext cx="4270375" cy="2401888"/>
+          </a:xfrm>
+        </p:spPr>
+      </p:sp>
+      <p:sp>
+        <p:nvSpPr>
+          <p:cNvPr id="3" name="Notizenplatzhalter 2"/>
+          <p:cNvSpPr>
+            <a:spLocks noGrp="1"/>
+          </p:cNvSpPr>
+          <p:nvPr>
+            <p:ph type="body" idx="1"/>
+          </p:nvPr>
+        </p:nvSpPr>
+        <p:spPr/>
+        <p:txBody>
+          <a:bodyPr/>
+          <a:lstStyle/>
+          <a:p>
+            <a:endParaRPr lang="de-DE"/>
+          </a:p>
+        </p:txBody>
+      </p:sp>
+      <p:sp>
+        <p:nvSpPr>
+          <p:cNvPr id="4" name="Foliennummernplatzhalter 3"/>
+          <p:cNvSpPr>
+            <a:spLocks noGrp="1"/>
+          </p:cNvSpPr>
+          <p:nvPr>
+            <p:ph type="sldNum" sz="quarter" idx="10"/>
+          </p:nvPr>
+        </p:nvSpPr>
+        <p:spPr/>
+        <p:txBody>
+          <a:bodyPr/>
+          <a:lstStyle/>
+          <a:p>
+            <a:fld id="{927DBD90-B360-417B-B4B3-F05A4AFC1996}" type="slidenum">
+              <a:rPr lang="de-DE" smtClean="0"/>
+              <a:t>48</a:t>
             </a:fld>
             <a:endParaRPr lang="de-DE"/>
           </a:p>
@@ -3700,7 +4155,7 @@
           <a:p>
             <a:fld id="{0617C99F-8972-4D55-9FC9-20A8973FEFCD}" type="datetime1">
               <a:rPr lang="de-DE" smtClean="0"/>
-              <a:t>29.09.2021</a:t>
+              <a:t>30.09.2021</a:t>
             </a:fld>
             <a:endParaRPr lang="de-DE"/>
           </a:p>
@@ -3905,7 +4360,7 @@
           <a:p>
             <a:fld id="{1CE60AF2-85CA-4EDA-9C85-340F8B534780}" type="datetime1">
               <a:rPr lang="de-DE" smtClean="0"/>
-              <a:t>29.09.2021</a:t>
+              <a:t>30.09.2021</a:t>
             </a:fld>
             <a:endParaRPr lang="de-DE"/>
           </a:p>
@@ -4059,7 +4514,7 @@
           <a:p>
             <a:fld id="{838A6544-C481-4408-8F7B-396A7E058B8C}" type="datetime1">
               <a:rPr lang="de-DE" smtClean="0"/>
-              <a:t>29.09.2021</a:t>
+              <a:t>30.09.2021</a:t>
             </a:fld>
             <a:endParaRPr lang="de-DE"/>
           </a:p>
@@ -4296,7 +4751,7 @@
           <a:p>
             <a:fld id="{849F51E4-763F-47D5-9CC8-41F20D31A3F9}" type="datetime1">
               <a:rPr lang="de-DE" smtClean="0"/>
-              <a:t>29.09.2021</a:t>
+              <a:t>30.09.2021</a:t>
             </a:fld>
             <a:endParaRPr lang="de-DE"/>
           </a:p>
@@ -4472,7 +4927,7 @@
           <a:p>
             <a:fld id="{DAFA5E08-56C4-4D00-93E8-8E8047A8DE89}" type="datetime1">
               <a:rPr lang="de-DE" smtClean="0"/>
-              <a:t>29.09.2021</a:t>
+              <a:t>30.09.2021</a:t>
             </a:fld>
             <a:endParaRPr lang="de-DE"/>
           </a:p>
@@ -4648,7 +5103,7 @@
           <a:p>
             <a:fld id="{7CE3AD37-5ABD-4692-BEC2-A42E3889EE4D}" type="datetime1">
               <a:rPr lang="de-DE" smtClean="0"/>
-              <a:t>29.09.2021</a:t>
+              <a:t>30.09.2021</a:t>
             </a:fld>
             <a:endParaRPr lang="de-DE"/>
           </a:p>
@@ -4798,7 +5253,7 @@
           <a:p>
             <a:fld id="{928CC653-232E-48C4-B8E8-A0241EBA0795}" type="datetime1">
               <a:rPr lang="de-DE" smtClean="0"/>
-              <a:t>29.09.2021</a:t>
+              <a:t>30.09.2021</a:t>
             </a:fld>
             <a:endParaRPr lang="de-DE"/>
           </a:p>
@@ -4896,7 +5351,7 @@
           <a:p>
             <a:fld id="{E83E20E9-81C0-4ABC-AE04-EB499B127B15}" type="datetime1">
               <a:rPr lang="de-DE" smtClean="0"/>
-              <a:t>29.09.2021</a:t>
+              <a:t>30.09.2021</a:t>
             </a:fld>
             <a:endParaRPr lang="de-DE"/>
           </a:p>
@@ -5020,7 +5475,7 @@
           <a:p>
             <a:fld id="{40D99F92-1030-4142-B53F-F0FAA5D39B24}" type="datetime1">
               <a:rPr lang="de-DE" smtClean="0"/>
-              <a:t>29.09.2021</a:t>
+              <a:t>30.09.2021</a:t>
             </a:fld>
             <a:endParaRPr lang="de-DE"/>
           </a:p>
@@ -5204,7 +5659,7 @@
           <a:p>
             <a:fld id="{71988543-CE63-49C4-AF7F-C87F3B679192}" type="datetime1">
               <a:rPr lang="de-DE" smtClean="0"/>
-              <a:t>29.09.2021</a:t>
+              <a:t>30.09.2021</a:t>
             </a:fld>
             <a:endParaRPr lang="de-DE"/>
           </a:p>
@@ -5409,7 +5864,7 @@
           <a:p>
             <a:fld id="{5D221FBA-B6C3-4E3C-B071-170A70C47015}" type="datetime1">
               <a:rPr lang="de-DE" smtClean="0"/>
-              <a:t>29.09.2021</a:t>
+              <a:t>30.09.2021</a:t>
             </a:fld>
             <a:endParaRPr lang="de-DE"/>
           </a:p>
@@ -5767,7 +6222,7 @@
           <a:p>
             <a:fld id="{990527E8-55A3-4E9A-A49F-ADA7D9BD24A6}" type="datetime1">
               <a:rPr lang="de-DE" smtClean="0"/>
-              <a:t>29.09.2021</a:t>
+              <a:t>30.09.2021</a:t>
             </a:fld>
             <a:endParaRPr lang="de-DE" dirty="0"/>
           </a:p>
@@ -6408,7 +6863,7 @@
           <a:p>
             <a:fld id="{ADC6AC59-7092-41FF-BAE3-16B17FCDA478}" type="datetime1">
               <a:rPr lang="de-DE" smtClean="0"/>
-              <a:t>29.09.2021</a:t>
+              <a:t>30.09.2021</a:t>
             </a:fld>
             <a:endParaRPr lang="de-DE" dirty="0"/>
           </a:p>
@@ -7080,7 +7535,7 @@
           <a:p>
             <a:fld id="{98371805-B777-4F9B-8B57-8DFA4E0BDD1E}" type="datetime1">
               <a:rPr lang="de-DE" smtClean="0"/>
-              <a:t>29.09.2021</a:t>
+              <a:t>30.09.2021</a:t>
             </a:fld>
             <a:endParaRPr lang="de-DE"/>
           </a:p>
@@ -7328,7 +7783,7 @@
           <a:p>
             <a:fld id="{DAFA5E08-56C4-4D00-93E8-8E8047A8DE89}" type="datetime1">
               <a:rPr lang="de-DE" smtClean="0"/>
-              <a:t>29.09.2021</a:t>
+              <a:t>30.09.2021</a:t>
             </a:fld>
             <a:endParaRPr lang="de-DE"/>
           </a:p>
@@ -7653,7 +8108,7 @@
           <a:p>
             <a:fld id="{DAFA5E08-56C4-4D00-93E8-8E8047A8DE89}" type="datetime1">
               <a:rPr lang="de-DE" smtClean="0"/>
-              <a:t>29.09.2021</a:t>
+              <a:t>30.09.2021</a:t>
             </a:fld>
             <a:endParaRPr lang="de-DE"/>
           </a:p>
@@ -7833,7 +8288,7 @@
           <a:p>
             <a:fld id="{DAFA5E08-56C4-4D00-93E8-8E8047A8DE89}" type="datetime1">
               <a:rPr lang="de-DE" smtClean="0"/>
-              <a:t>29.09.2021</a:t>
+              <a:t>30.09.2021</a:t>
             </a:fld>
             <a:endParaRPr lang="de-DE"/>
           </a:p>
@@ -8078,7 +8533,7 @@
           <a:p>
             <a:fld id="{DAFA5E08-56C4-4D00-93E8-8E8047A8DE89}" type="datetime1">
               <a:rPr lang="de-DE" smtClean="0"/>
-              <a:t>29.09.2021</a:t>
+              <a:t>30.09.2021</a:t>
             </a:fld>
             <a:endParaRPr lang="de-DE"/>
           </a:p>
@@ -8412,7 +8867,7 @@
           <a:p>
             <a:fld id="{DAFA5E08-56C4-4D00-93E8-8E8047A8DE89}" type="datetime1">
               <a:rPr lang="de-DE" smtClean="0"/>
-              <a:t>29.09.2021</a:t>
+              <a:t>30.09.2021</a:t>
             </a:fld>
             <a:endParaRPr lang="de-DE"/>
           </a:p>
@@ -8725,7 +9180,7 @@
           <a:p>
             <a:fld id="{DAFA5E08-56C4-4D00-93E8-8E8047A8DE89}" type="datetime1">
               <a:rPr lang="de-DE" smtClean="0"/>
-              <a:t>29.09.2021</a:t>
+              <a:t>30.09.2021</a:t>
             </a:fld>
             <a:endParaRPr lang="de-DE"/>
           </a:p>
@@ -8979,7 +9434,7 @@
           <a:p>
             <a:fld id="{DAFA5E08-56C4-4D00-93E8-8E8047A8DE89}" type="datetime1">
               <a:rPr lang="de-DE" smtClean="0"/>
-              <a:t>29.09.2021</a:t>
+              <a:t>30.09.2021</a:t>
             </a:fld>
             <a:endParaRPr lang="de-DE"/>
           </a:p>
@@ -9253,7 +9708,7 @@
           <a:p>
             <a:fld id="{DAFA5E08-56C4-4D00-93E8-8E8047A8DE89}" type="datetime1">
               <a:rPr lang="de-DE" smtClean="0"/>
-              <a:t>29.09.2021</a:t>
+              <a:t>30.09.2021</a:t>
             </a:fld>
             <a:endParaRPr lang="de-DE"/>
           </a:p>
@@ -9507,7 +9962,7 @@
           <a:p>
             <a:fld id="{DAFA5E08-56C4-4D00-93E8-8E8047A8DE89}" type="datetime1">
               <a:rPr lang="de-DE" smtClean="0"/>
-              <a:t>29.09.2021</a:t>
+              <a:t>30.09.2021</a:t>
             </a:fld>
             <a:endParaRPr lang="de-DE"/>
           </a:p>
@@ -9770,7 +10225,7 @@
           <a:p>
             <a:fld id="{DAFA5E08-56C4-4D00-93E8-8E8047A8DE89}" type="datetime1">
               <a:rPr lang="de-DE" smtClean="0"/>
-              <a:t>29.09.2021</a:t>
+              <a:t>30.09.2021</a:t>
             </a:fld>
             <a:endParaRPr lang="de-DE"/>
           </a:p>
@@ -9977,7 +10432,10 @@
             </a:r>
           </a:p>
           <a:p>
-            <a:endParaRPr lang="de-DE" dirty="0"/>
+            <a:r>
+              <a:rPr lang="de-DE" dirty="0"/>
+              <a:t>Virtuelles Gerät erstellen</a:t>
+            </a:r>
           </a:p>
         </p:txBody>
       </p:sp>
@@ -9998,7 +10456,7 @@
           <a:p>
             <a:fld id="{6228E3B4-E3B1-4C82-9E48-25368E581931}" type="datetime1">
               <a:rPr lang="de-DE" smtClean="0"/>
-              <a:t>29.09.2021</a:t>
+              <a:t>30.09.2021</a:t>
             </a:fld>
             <a:endParaRPr lang="de-DE"/>
           </a:p>
@@ -10173,7 +10631,7 @@
           <a:p>
             <a:fld id="{DAFA5E08-56C4-4D00-93E8-8E8047A8DE89}" type="datetime1">
               <a:rPr lang="de-DE" smtClean="0"/>
-              <a:t>29.09.2021</a:t>
+              <a:t>30.09.2021</a:t>
             </a:fld>
             <a:endParaRPr lang="de-DE"/>
           </a:p>
@@ -10435,7 +10893,7 @@
           <a:p>
             <a:fld id="{DAFA5E08-56C4-4D00-93E8-8E8047A8DE89}" type="datetime1">
               <a:rPr lang="de-DE" smtClean="0"/>
-              <a:t>29.09.2021</a:t>
+              <a:t>30.09.2021</a:t>
             </a:fld>
             <a:endParaRPr lang="de-DE"/>
           </a:p>
@@ -10716,7 +11174,7 @@
           <a:p>
             <a:fld id="{DAFA5E08-56C4-4D00-93E8-8E8047A8DE89}" type="datetime1">
               <a:rPr lang="de-DE" smtClean="0"/>
-              <a:t>29.09.2021</a:t>
+              <a:t>30.09.2021</a:t>
             </a:fld>
             <a:endParaRPr lang="de-DE"/>
           </a:p>
@@ -11046,7 +11504,7 @@
           <a:p>
             <a:fld id="{DAFA5E08-56C4-4D00-93E8-8E8047A8DE89}" type="datetime1">
               <a:rPr lang="de-DE" smtClean="0"/>
-              <a:t>29.09.2021</a:t>
+              <a:t>30.09.2021</a:t>
             </a:fld>
             <a:endParaRPr lang="de-DE"/>
           </a:p>
@@ -11311,7 +11769,7 @@
           <a:p>
             <a:fld id="{DAFA5E08-56C4-4D00-93E8-8E8047A8DE89}" type="datetime1">
               <a:rPr lang="de-DE" smtClean="0"/>
-              <a:t>29.09.2021</a:t>
+              <a:t>30.09.2021</a:t>
             </a:fld>
             <a:endParaRPr lang="de-DE"/>
           </a:p>
@@ -11655,7 +12113,7 @@
           <a:p>
             <a:fld id="{DAFA5E08-56C4-4D00-93E8-8E8047A8DE89}" type="datetime1">
               <a:rPr lang="de-DE" smtClean="0"/>
-              <a:t>29.09.2021</a:t>
+              <a:t>30.09.2021</a:t>
             </a:fld>
             <a:endParaRPr lang="de-DE"/>
           </a:p>
@@ -11960,7 +12418,7 @@
           <a:p>
             <a:fld id="{DAFA5E08-56C4-4D00-93E8-8E8047A8DE89}" type="datetime1">
               <a:rPr lang="de-DE" smtClean="0"/>
-              <a:t>29.09.2021</a:t>
+              <a:t>30.09.2021</a:t>
             </a:fld>
             <a:endParaRPr lang="de-DE"/>
           </a:p>
@@ -12357,7 +12815,7 @@
           <a:p>
             <a:fld id="{DAFA5E08-56C4-4D00-93E8-8E8047A8DE89}" type="datetime1">
               <a:rPr lang="de-DE" smtClean="0"/>
-              <a:t>29.09.2021</a:t>
+              <a:t>30.09.2021</a:t>
             </a:fld>
             <a:endParaRPr lang="de-DE"/>
           </a:p>
@@ -12639,7 +13097,7 @@
           <a:p>
             <a:fld id="{DAFA5E08-56C4-4D00-93E8-8E8047A8DE89}" type="datetime1">
               <a:rPr lang="de-DE" smtClean="0"/>
-              <a:t>29.09.2021</a:t>
+              <a:t>30.09.2021</a:t>
             </a:fld>
             <a:endParaRPr lang="de-DE"/>
           </a:p>
@@ -12899,7 +13357,7 @@
           <a:p>
             <a:fld id="{DAFA5E08-56C4-4D00-93E8-8E8047A8DE89}" type="datetime1">
               <a:rPr lang="de-DE" smtClean="0"/>
-              <a:t>29.09.2021</a:t>
+              <a:t>30.09.2021</a:t>
             </a:fld>
             <a:endParaRPr lang="de-DE"/>
           </a:p>
@@ -13097,7 +13555,7 @@
           <a:p>
             <a:fld id="{29F03F87-5FC1-454A-B924-57348B963929}" type="datetime1">
               <a:rPr lang="de-DE" smtClean="0"/>
-              <a:t>29.09.2021</a:t>
+              <a:t>30.09.2021</a:t>
             </a:fld>
             <a:endParaRPr lang="de-DE"/>
           </a:p>
@@ -13328,7 +13786,7 @@
           <a:p>
             <a:fld id="{DAFA5E08-56C4-4D00-93E8-8E8047A8DE89}" type="datetime1">
               <a:rPr lang="de-DE" smtClean="0"/>
-              <a:t>29.09.2021</a:t>
+              <a:t>30.09.2021</a:t>
             </a:fld>
             <a:endParaRPr lang="de-DE"/>
           </a:p>
@@ -13647,7 +14105,7 @@
           <a:p>
             <a:fld id="{DAFA5E08-56C4-4D00-93E8-8E8047A8DE89}" type="datetime1">
               <a:rPr lang="de-DE" smtClean="0"/>
-              <a:t>29.09.2021</a:t>
+              <a:t>30.09.2021</a:t>
             </a:fld>
             <a:endParaRPr lang="de-DE"/>
           </a:p>
@@ -13849,7 +14307,7 @@
           <a:p>
             <a:fld id="{DAFA5E08-56C4-4D00-93E8-8E8047A8DE89}" type="datetime1">
               <a:rPr lang="de-DE" smtClean="0"/>
-              <a:t>29.09.2021</a:t>
+              <a:t>30.09.2021</a:t>
             </a:fld>
             <a:endParaRPr lang="de-DE"/>
           </a:p>
@@ -13995,7 +14453,7 @@
           <a:p>
             <a:r>
               <a:rPr lang="de-DE" dirty="0"/>
-              <a:t>Übungsprojekt für BOGY</a:t>
+              <a:t>Demo-App ausprobieren</a:t>
             </a:r>
           </a:p>
         </p:txBody>
@@ -14056,7 +14514,7 @@
           <a:p>
             <a:fld id="{DAFA5E08-56C4-4D00-93E8-8E8047A8DE89}" type="datetime1">
               <a:rPr lang="de-DE" smtClean="0"/>
-              <a:t>29.09.2021</a:t>
+              <a:t>30.09.2021</a:t>
             </a:fld>
             <a:endParaRPr lang="de-DE"/>
           </a:p>
@@ -14254,7 +14712,7 @@
           <a:p>
             <a:r>
               <a:rPr lang="de-DE" dirty="0"/>
-              <a:t>Übungsprojekt für BOGY</a:t>
+              <a:t>Demo-App ausprobieren</a:t>
             </a:r>
           </a:p>
         </p:txBody>
@@ -14319,7 +14777,7 @@
           <a:p>
             <a:fld id="{DAFA5E08-56C4-4D00-93E8-8E8047A8DE89}" type="datetime1">
               <a:rPr lang="de-DE" smtClean="0"/>
-              <a:t>29.09.2021</a:t>
+              <a:t>30.09.2021</a:t>
             </a:fld>
             <a:endParaRPr lang="de-DE"/>
           </a:p>
@@ -14517,7 +14975,7 @@
           <a:p>
             <a:r>
               <a:rPr lang="de-DE" dirty="0"/>
-              <a:t>Übungsprojekt für BOGY</a:t>
+              <a:t>Demo-App ausprobieren</a:t>
             </a:r>
           </a:p>
         </p:txBody>
@@ -14627,7 +15085,7 @@
           <a:p>
             <a:fld id="{DAFA5E08-56C4-4D00-93E8-8E8047A8DE89}" type="datetime1">
               <a:rPr lang="de-DE" smtClean="0"/>
-              <a:t>29.09.2021</a:t>
+              <a:t>30.09.2021</a:t>
             </a:fld>
             <a:endParaRPr lang="de-DE"/>
           </a:p>
@@ -14929,7 +15387,7 @@
           <a:p>
             <a:r>
               <a:rPr lang="de-DE" dirty="0"/>
-              <a:t>Übungsprojekt für BOGY</a:t>
+              <a:t>Demo-App ausprobieren</a:t>
             </a:r>
           </a:p>
         </p:txBody>
@@ -15011,7 +15469,7 @@
           <a:p>
             <a:fld id="{DAFA5E08-56C4-4D00-93E8-8E8047A8DE89}" type="datetime1">
               <a:rPr lang="de-DE" smtClean="0"/>
-              <a:t>29.09.2021</a:t>
+              <a:t>30.09.2021</a:t>
             </a:fld>
             <a:endParaRPr lang="de-DE"/>
           </a:p>
@@ -15239,7 +15697,7 @@
           <a:p>
             <a:r>
               <a:rPr lang="de-DE" dirty="0"/>
-              <a:t>Übungsprojekt für BOGY</a:t>
+              <a:t>Demo-App ausprobieren</a:t>
             </a:r>
           </a:p>
         </p:txBody>
@@ -15267,7 +15725,7 @@
           <a:p>
             <a:r>
               <a:rPr lang="de-DE" dirty="0"/>
-              <a:t>Einmal laufen lassen</a:t>
+              <a:t>Einmal laufen lassen (Webbrowser-Version)</a:t>
             </a:r>
           </a:p>
         </p:txBody>
@@ -15295,7 +15753,7 @@
           <a:p>
             <a:fld id="{DAFA5E08-56C4-4D00-93E8-8E8047A8DE89}" type="datetime1">
               <a:rPr lang="de-DE" smtClean="0"/>
-              <a:t>29.09.2021</a:t>
+              <a:t>30.09.2021</a:t>
             </a:fld>
             <a:endParaRPr lang="de-DE"/>
           </a:p>
@@ -15557,7 +16015,7 @@
           <p:cNvPr id="2" name="Titel 1">
             <a:extLst>
               <a:ext uri="{FF2B5EF4-FFF2-40B4-BE49-F238E27FC236}">
-                <a16:creationId xmlns:a16="http://schemas.microsoft.com/office/drawing/2014/main" id="{A00C8FA2-3D0F-4462-B489-9D479E59C16D}"/>
+                <a16:creationId xmlns:a16="http://schemas.microsoft.com/office/drawing/2014/main" id="{FF42BAE0-45C1-44C2-A239-33EA0901AA61}"/>
               </a:ext>
             </a:extLst>
           </p:cNvPr>
@@ -15575,7 +16033,7 @@
           <a:p>
             <a:r>
               <a:rPr lang="de-DE" dirty="0"/>
-              <a:t>Übungsprojekt für BOGY</a:t>
+              <a:t>Virtuelles Gerät anlegen</a:t>
             </a:r>
           </a:p>
         </p:txBody>
@@ -15585,7 +16043,7 @@
           <p:cNvPr id="3" name="Inhaltsplatzhalter 2">
             <a:extLst>
               <a:ext uri="{FF2B5EF4-FFF2-40B4-BE49-F238E27FC236}">
-                <a16:creationId xmlns:a16="http://schemas.microsoft.com/office/drawing/2014/main" id="{EF420444-B9D9-449D-9F83-EDAC6443C9E0}"/>
+                <a16:creationId xmlns:a16="http://schemas.microsoft.com/office/drawing/2014/main" id="{494D6467-A2E3-442F-A44E-F6D399AA5FF8}"/>
               </a:ext>
             </a:extLst>
           </p:cNvPr>
@@ -15603,60 +16061,8 @@
           <a:p>
             <a:r>
               <a:rPr lang="de-DE" dirty="0"/>
-              <a:t>Öffne </a:t>
-            </a:r>
-            <a:r>
-              <a:rPr lang="de-DE" dirty="0" err="1">
-                <a:solidFill>
-                  <a:schemeClr val="tx2"/>
-                </a:solidFill>
-                <a:latin typeface="Consolas" panose="020B0609020204030204" pitchFamily="49" charset="0"/>
-              </a:rPr>
-              <a:t>lib</a:t>
-            </a:r>
-            <a:r>
-              <a:rPr lang="de-DE" dirty="0">
-                <a:solidFill>
-                  <a:schemeClr val="tx2"/>
-                </a:solidFill>
-                <a:latin typeface="Consolas" panose="020B0609020204030204" pitchFamily="49" charset="0"/>
-              </a:rPr>
-              <a:t>/</a:t>
-            </a:r>
-            <a:r>
-              <a:rPr lang="de-DE" dirty="0" err="1">
-                <a:solidFill>
-                  <a:schemeClr val="tx2"/>
-                </a:solidFill>
-                <a:latin typeface="Consolas" panose="020B0609020204030204" pitchFamily="49" charset="0"/>
-              </a:rPr>
-              <a:t>main.dart</a:t>
-            </a:r>
-            <a:endParaRPr lang="de-DE" dirty="0">
-              <a:solidFill>
-                <a:schemeClr val="tx2"/>
-              </a:solidFill>
-              <a:latin typeface="Consolas" panose="020B0609020204030204" pitchFamily="49" charset="0"/>
-            </a:endParaRPr>
-          </a:p>
-          <a:p>
-            <a:r>
-              <a:rPr lang="de-DE" dirty="0">
-                <a:latin typeface="Consolas" panose="020B0609020204030204" pitchFamily="49" charset="0"/>
-              </a:rPr>
-              <a:t>Alles löschen</a:t>
-            </a:r>
-          </a:p>
-          <a:p>
-            <a:r>
-              <a:rPr lang="de-DE" dirty="0">
-                <a:latin typeface="Consolas" panose="020B0609020204030204" pitchFamily="49" charset="0"/>
-              </a:rPr>
-              <a:t>Dann:</a:t>
-            </a:r>
-          </a:p>
-          <a:p>
-            <a:endParaRPr lang="de-DE" dirty="0"/>
+              <a:t>In Android Studio: AVD Manager</a:t>
+            </a:r>
           </a:p>
         </p:txBody>
       </p:sp>
@@ -15665,7 +16071,7 @@
           <p:cNvPr id="4" name="Datumsplatzhalter 3">
             <a:extLst>
               <a:ext uri="{FF2B5EF4-FFF2-40B4-BE49-F238E27FC236}">
-                <a16:creationId xmlns:a16="http://schemas.microsoft.com/office/drawing/2014/main" id="{B9F44BAF-14C3-4189-B74D-915E8CF56F5B}"/>
+                <a16:creationId xmlns:a16="http://schemas.microsoft.com/office/drawing/2014/main" id="{30FAF8C3-2F4B-4EF7-8353-40DFA0E6A115}"/>
               </a:ext>
             </a:extLst>
           </p:cNvPr>
@@ -15683,7 +16089,7 @@
           <a:p>
             <a:fld id="{DAFA5E08-56C4-4D00-93E8-8E8047A8DE89}" type="datetime1">
               <a:rPr lang="de-DE" smtClean="0"/>
-              <a:t>29.09.2021</a:t>
+              <a:t>30.09.2021</a:t>
             </a:fld>
             <a:endParaRPr lang="de-DE"/>
           </a:p>
@@ -15694,7 +16100,7 @@
           <p:cNvPr id="5" name="Fußzeilenplatzhalter 4">
             <a:extLst>
               <a:ext uri="{FF2B5EF4-FFF2-40B4-BE49-F238E27FC236}">
-                <a16:creationId xmlns:a16="http://schemas.microsoft.com/office/drawing/2014/main" id="{2C6060AF-582E-4CB3-BA70-301162BF6574}"/>
+                <a16:creationId xmlns:a16="http://schemas.microsoft.com/office/drawing/2014/main" id="{4540F2C8-4CB7-44C4-97EB-AB137F741496}"/>
               </a:ext>
             </a:extLst>
           </p:cNvPr>
@@ -15722,7 +16128,7 @@
           <p:cNvPr id="6" name="Foliennummernplatzhalter 5">
             <a:extLst>
               <a:ext uri="{FF2B5EF4-FFF2-40B4-BE49-F238E27FC236}">
-                <a16:creationId xmlns:a16="http://schemas.microsoft.com/office/drawing/2014/main" id="{BB168572-FF3C-485B-934A-3CBFA358045B}"/>
+                <a16:creationId xmlns:a16="http://schemas.microsoft.com/office/drawing/2014/main" id="{E32B2891-69AA-4D94-8CE7-8F34AF5F8119}"/>
               </a:ext>
             </a:extLst>
           </p:cNvPr>
@@ -15748,10 +16154,10 @@
       </p:sp>
       <p:pic>
         <p:nvPicPr>
-          <p:cNvPr id="9" name="Grafik 8">
-            <a:extLst>
-              <a:ext uri="{FF2B5EF4-FFF2-40B4-BE49-F238E27FC236}">
-                <a16:creationId xmlns:a16="http://schemas.microsoft.com/office/drawing/2014/main" id="{C5BCCE3B-DEF0-4313-8E93-024E31FE5B4F}"/>
+          <p:cNvPr id="8" name="Grafik 7">
+            <a:extLst>
+              <a:ext uri="{FF2B5EF4-FFF2-40B4-BE49-F238E27FC236}">
+                <a16:creationId xmlns:a16="http://schemas.microsoft.com/office/drawing/2014/main" id="{C9CE4F96-5708-48BE-AA3C-1663A45333F6}"/>
               </a:ext>
             </a:extLst>
           </p:cNvPr>
@@ -15761,25 +16167,159 @@
           <p:nvPr/>
         </p:nvPicPr>
         <p:blipFill>
-          <a:blip r:embed="rId2"/>
+          <a:blip r:embed="rId3"/>
           <a:stretch>
             <a:fillRect/>
           </a:stretch>
         </p:blipFill>
         <p:spPr>
           <a:xfrm>
-            <a:off x="1168086" y="3015981"/>
-            <a:ext cx="6526538" cy="2217031"/>
+            <a:off x="1085451" y="2790964"/>
+            <a:ext cx="5888830" cy="3374885"/>
           </a:xfrm>
           <a:prstGeom prst="rect">
             <a:avLst/>
           </a:prstGeom>
         </p:spPr>
       </p:pic>
+      <p:pic>
+        <p:nvPicPr>
+          <p:cNvPr id="10" name="Grafik 9">
+            <a:extLst>
+              <a:ext uri="{FF2B5EF4-FFF2-40B4-BE49-F238E27FC236}">
+                <a16:creationId xmlns:a16="http://schemas.microsoft.com/office/drawing/2014/main" id="{C30A7C00-821A-4FC0-BE2E-DFAC85E7D283}"/>
+              </a:ext>
+            </a:extLst>
+          </p:cNvPr>
+          <p:cNvPicPr>
+            <a:picLocks noChangeAspect="1"/>
+          </p:cNvPicPr>
+          <p:nvPr/>
+        </p:nvPicPr>
+        <p:blipFill>
+          <a:blip r:embed="rId4"/>
+          <a:stretch>
+            <a:fillRect/>
+          </a:stretch>
+        </p:blipFill>
+        <p:spPr>
+          <a:xfrm>
+            <a:off x="1085451" y="1992267"/>
+            <a:ext cx="5888830" cy="609846"/>
+          </a:xfrm>
+          <a:prstGeom prst="rect">
+            <a:avLst/>
+          </a:prstGeom>
+        </p:spPr>
+      </p:pic>
+      <p:sp>
+        <p:nvSpPr>
+          <p:cNvPr id="11" name="Rechteck 10">
+            <a:extLst>
+              <a:ext uri="{FF2B5EF4-FFF2-40B4-BE49-F238E27FC236}">
+                <a16:creationId xmlns:a16="http://schemas.microsoft.com/office/drawing/2014/main" id="{03762DDA-8FBA-49EA-BBE9-2AA78349EB16}"/>
+              </a:ext>
+            </a:extLst>
+          </p:cNvPr>
+          <p:cNvSpPr/>
+          <p:nvPr/>
+        </p:nvSpPr>
+        <p:spPr>
+          <a:xfrm>
+            <a:off x="5879138" y="2228344"/>
+            <a:ext cx="383127" cy="351317"/>
+          </a:xfrm>
+          <a:prstGeom prst="rect">
+            <a:avLst/>
+          </a:prstGeom>
+          <a:noFill/>
+          <a:ln w="28575">
+            <a:solidFill>
+              <a:schemeClr val="accent1"/>
+            </a:solidFill>
+          </a:ln>
+        </p:spPr>
+        <p:style>
+          <a:lnRef idx="2">
+            <a:schemeClr val="accent1">
+              <a:shade val="50000"/>
+            </a:schemeClr>
+          </a:lnRef>
+          <a:fillRef idx="1">
+            <a:schemeClr val="accent1"/>
+          </a:fillRef>
+          <a:effectRef idx="0">
+            <a:schemeClr val="accent1"/>
+          </a:effectRef>
+          <a:fontRef idx="minor">
+            <a:schemeClr val="lt1"/>
+          </a:fontRef>
+        </p:style>
+        <p:txBody>
+          <a:bodyPr rtlCol="0" anchor="ctr"/>
+          <a:lstStyle/>
+          <a:p>
+            <a:pPr algn="ctr"/>
+            <a:endParaRPr lang="de-DE"/>
+          </a:p>
+        </p:txBody>
+      </p:sp>
+      <p:sp>
+        <p:nvSpPr>
+          <p:cNvPr id="12" name="Rechteck 11">
+            <a:extLst>
+              <a:ext uri="{FF2B5EF4-FFF2-40B4-BE49-F238E27FC236}">
+                <a16:creationId xmlns:a16="http://schemas.microsoft.com/office/drawing/2014/main" id="{42780FD6-E617-47E2-B961-3642793E1C8D}"/>
+              </a:ext>
+            </a:extLst>
+          </p:cNvPr>
+          <p:cNvSpPr/>
+          <p:nvPr/>
+        </p:nvSpPr>
+        <p:spPr>
+          <a:xfrm>
+            <a:off x="3263456" y="4810551"/>
+            <a:ext cx="1528881" cy="351317"/>
+          </a:xfrm>
+          <a:prstGeom prst="rect">
+            <a:avLst/>
+          </a:prstGeom>
+          <a:noFill/>
+          <a:ln w="28575">
+            <a:solidFill>
+              <a:schemeClr val="accent1"/>
+            </a:solidFill>
+          </a:ln>
+        </p:spPr>
+        <p:style>
+          <a:lnRef idx="2">
+            <a:schemeClr val="accent1">
+              <a:shade val="50000"/>
+            </a:schemeClr>
+          </a:lnRef>
+          <a:fillRef idx="1">
+            <a:schemeClr val="accent1"/>
+          </a:fillRef>
+          <a:effectRef idx="0">
+            <a:schemeClr val="accent1"/>
+          </a:effectRef>
+          <a:fontRef idx="minor">
+            <a:schemeClr val="lt1"/>
+          </a:fontRef>
+        </p:style>
+        <p:txBody>
+          <a:bodyPr rtlCol="0" anchor="ctr"/>
+          <a:lstStyle/>
+          <a:p>
+            <a:pPr algn="ctr"/>
+            <a:endParaRPr lang="de-DE"/>
+          </a:p>
+        </p:txBody>
+      </p:sp>
     </p:spTree>
     <p:extLst>
       <p:ext uri="{BB962C8B-B14F-4D97-AF65-F5344CB8AC3E}">
-        <p14:creationId xmlns:p14="http://schemas.microsoft.com/office/powerpoint/2010/main" val="3323847647"/>
+        <p14:creationId xmlns:p14="http://schemas.microsoft.com/office/powerpoint/2010/main" val="124271397"/>
       </p:ext>
     </p:extLst>
   </p:cSld>
@@ -15808,7 +16348,13 @@
       </p:grpSpPr>
       <p:sp>
         <p:nvSpPr>
-          <p:cNvPr id="4" name="Titel 3"/>
+          <p:cNvPr id="2" name="Titel 1">
+            <a:extLst>
+              <a:ext uri="{FF2B5EF4-FFF2-40B4-BE49-F238E27FC236}">
+                <a16:creationId xmlns:a16="http://schemas.microsoft.com/office/drawing/2014/main" id="{FF42BAE0-45C1-44C2-A239-33EA0901AA61}"/>
+              </a:ext>
+            </a:extLst>
+          </p:cNvPr>
           <p:cNvSpPr>
             <a:spLocks noGrp="1"/>
           </p:cNvSpPr>
@@ -15823,14 +16369,20 @@
           <a:p>
             <a:r>
               <a:rPr lang="de-DE" dirty="0"/>
-              <a:t>Zusammenfassung</a:t>
-            </a:r>
-          </a:p>
-        </p:txBody>
-      </p:sp>
-      <p:sp>
-        <p:nvSpPr>
-          <p:cNvPr id="5" name="Inhaltsplatzhalter 4"/>
+              <a:t>Virtuelles Gerät anlegen</a:t>
+            </a:r>
+          </a:p>
+        </p:txBody>
+      </p:sp>
+      <p:sp>
+        <p:nvSpPr>
+          <p:cNvPr id="3" name="Inhaltsplatzhalter 2">
+            <a:extLst>
+              <a:ext uri="{FF2B5EF4-FFF2-40B4-BE49-F238E27FC236}">
+                <a16:creationId xmlns:a16="http://schemas.microsoft.com/office/drawing/2014/main" id="{494D6467-A2E3-442F-A44E-F6D399AA5FF8}"/>
+              </a:ext>
+            </a:extLst>
+          </p:cNvPr>
           <p:cNvSpPr>
             <a:spLocks noGrp="1"/>
           </p:cNvSpPr>
@@ -15845,47 +16397,20 @@
           <a:p>
             <a:r>
               <a:rPr lang="de-DE" dirty="0"/>
-              <a:t>Das erstmalige Einrichten einer Entwicklungsumgebung kann aufwändig sein</a:t>
-            </a:r>
-          </a:p>
-          <a:p>
-            <a:endParaRPr lang="de-DE" dirty="0"/>
-          </a:p>
-          <a:p>
-            <a:r>
-              <a:rPr lang="de-DE" dirty="0"/>
-              <a:t>Zum Programmieren braucht man eher einen ordentlichen PC</a:t>
-            </a:r>
-          </a:p>
-          <a:p>
-            <a:pPr lvl="1"/>
-            <a:r>
-              <a:rPr lang="de-DE" dirty="0"/>
-              <a:t>Genug Speicherplatz</a:t>
-            </a:r>
-          </a:p>
-          <a:p>
-            <a:pPr lvl="1"/>
-            <a:r>
-              <a:rPr lang="de-DE" dirty="0"/>
-              <a:t>Genug Rechenleistung</a:t>
-            </a:r>
-          </a:p>
-          <a:p>
-            <a:pPr lvl="1"/>
-            <a:endParaRPr lang="de-DE" dirty="0"/>
-          </a:p>
-          <a:p>
-            <a:r>
-              <a:rPr lang="de-DE" dirty="0"/>
-              <a:t>Wir haben alles soweit vorbereitet, dass wir jetzt mit dem Programmieren loslegen und die Sprache Dart erlernen können.</a:t>
-            </a:r>
-          </a:p>
-        </p:txBody>
-      </p:sp>
-      <p:sp>
-        <p:nvSpPr>
-          <p:cNvPr id="2" name="Datumsplatzhalter 1"/>
+              <a:t>Suche nach Pixel, Pixel 4 auswählen (mit Play Store)</a:t>
+            </a:r>
+          </a:p>
+        </p:txBody>
+      </p:sp>
+      <p:sp>
+        <p:nvSpPr>
+          <p:cNvPr id="4" name="Datumsplatzhalter 3">
+            <a:extLst>
+              <a:ext uri="{FF2B5EF4-FFF2-40B4-BE49-F238E27FC236}">
+                <a16:creationId xmlns:a16="http://schemas.microsoft.com/office/drawing/2014/main" id="{30FAF8C3-2F4B-4EF7-8353-40DFA0E6A115}"/>
+              </a:ext>
+            </a:extLst>
+          </p:cNvPr>
           <p:cNvSpPr>
             <a:spLocks noGrp="1"/>
           </p:cNvSpPr>
@@ -15898,9 +16423,9 @@
           <a:bodyPr/>
           <a:lstStyle/>
           <a:p>
-            <a:fld id="{89ACDE42-010D-4487-A37F-627E4B397EF3}" type="datetime1">
+            <a:fld id="{DAFA5E08-56C4-4D00-93E8-8E8047A8DE89}" type="datetime1">
               <a:rPr lang="de-DE" smtClean="0"/>
-              <a:t>29.09.2021</a:t>
+              <a:t>30.09.2021</a:t>
             </a:fld>
             <a:endParaRPr lang="de-DE"/>
           </a:p>
@@ -15908,7 +16433,13 @@
       </p:sp>
       <p:sp>
         <p:nvSpPr>
-          <p:cNvPr id="3" name="Fußzeilenplatzhalter 2"/>
+          <p:cNvPr id="5" name="Fußzeilenplatzhalter 4">
+            <a:extLst>
+              <a:ext uri="{FF2B5EF4-FFF2-40B4-BE49-F238E27FC236}">
+                <a16:creationId xmlns:a16="http://schemas.microsoft.com/office/drawing/2014/main" id="{4540F2C8-4CB7-44C4-97EB-AB137F741496}"/>
+              </a:ext>
+            </a:extLst>
+          </p:cNvPr>
           <p:cNvSpPr>
             <a:spLocks noGrp="1"/>
           </p:cNvSpPr>
@@ -15930,7 +16461,13 @@
       </p:sp>
       <p:sp>
         <p:nvSpPr>
-          <p:cNvPr id="6" name="Foliennummernplatzhalter 5"/>
+          <p:cNvPr id="6" name="Foliennummernplatzhalter 5">
+            <a:extLst>
+              <a:ext uri="{FF2B5EF4-FFF2-40B4-BE49-F238E27FC236}">
+                <a16:creationId xmlns:a16="http://schemas.microsoft.com/office/drawing/2014/main" id="{E32B2891-69AA-4D94-8CE7-8F34AF5F8119}"/>
+              </a:ext>
+            </a:extLst>
+          </p:cNvPr>
           <p:cNvSpPr>
             <a:spLocks noGrp="1"/>
           </p:cNvSpPr>
@@ -15951,10 +16488,144 @@
           </a:p>
         </p:txBody>
       </p:sp>
+      <p:pic>
+        <p:nvPicPr>
+          <p:cNvPr id="9" name="Grafik 8">
+            <a:extLst>
+              <a:ext uri="{FF2B5EF4-FFF2-40B4-BE49-F238E27FC236}">
+                <a16:creationId xmlns:a16="http://schemas.microsoft.com/office/drawing/2014/main" id="{6759845D-3EAF-449C-BDFE-98B491E6DF76}"/>
+              </a:ext>
+            </a:extLst>
+          </p:cNvPr>
+          <p:cNvPicPr>
+            <a:picLocks noChangeAspect="1"/>
+          </p:cNvPicPr>
+          <p:nvPr/>
+        </p:nvPicPr>
+        <p:blipFill>
+          <a:blip r:embed="rId3"/>
+          <a:stretch>
+            <a:fillRect/>
+          </a:stretch>
+        </p:blipFill>
+        <p:spPr>
+          <a:xfrm>
+            <a:off x="1141011" y="1978155"/>
+            <a:ext cx="6603847" cy="4121643"/>
+          </a:xfrm>
+          <a:prstGeom prst="rect">
+            <a:avLst/>
+          </a:prstGeom>
+        </p:spPr>
+      </p:pic>
+      <p:sp>
+        <p:nvSpPr>
+          <p:cNvPr id="13" name="Rechteck 12">
+            <a:extLst>
+              <a:ext uri="{FF2B5EF4-FFF2-40B4-BE49-F238E27FC236}">
+                <a16:creationId xmlns:a16="http://schemas.microsoft.com/office/drawing/2014/main" id="{A3147154-E7CA-492E-896A-72964F85C065}"/>
+              </a:ext>
+            </a:extLst>
+          </p:cNvPr>
+          <p:cNvSpPr/>
+          <p:nvPr/>
+        </p:nvSpPr>
+        <p:spPr>
+          <a:xfrm>
+            <a:off x="2016808" y="3253341"/>
+            <a:ext cx="682326" cy="351317"/>
+          </a:xfrm>
+          <a:prstGeom prst="rect">
+            <a:avLst/>
+          </a:prstGeom>
+          <a:noFill/>
+          <a:ln w="28575">
+            <a:solidFill>
+              <a:schemeClr val="accent1"/>
+            </a:solidFill>
+          </a:ln>
+        </p:spPr>
+        <p:style>
+          <a:lnRef idx="2">
+            <a:schemeClr val="accent1">
+              <a:shade val="50000"/>
+            </a:schemeClr>
+          </a:lnRef>
+          <a:fillRef idx="1">
+            <a:schemeClr val="accent1"/>
+          </a:fillRef>
+          <a:effectRef idx="0">
+            <a:schemeClr val="accent1"/>
+          </a:effectRef>
+          <a:fontRef idx="minor">
+            <a:schemeClr val="lt1"/>
+          </a:fontRef>
+        </p:style>
+        <p:txBody>
+          <a:bodyPr rtlCol="0" anchor="ctr"/>
+          <a:lstStyle/>
+          <a:p>
+            <a:pPr algn="ctr"/>
+            <a:endParaRPr lang="de-DE"/>
+          </a:p>
+        </p:txBody>
+      </p:sp>
+      <p:sp>
+        <p:nvSpPr>
+          <p:cNvPr id="14" name="Rechteck 13">
+            <a:extLst>
+              <a:ext uri="{FF2B5EF4-FFF2-40B4-BE49-F238E27FC236}">
+                <a16:creationId xmlns:a16="http://schemas.microsoft.com/office/drawing/2014/main" id="{349683F2-9D2D-4D4B-8684-EF599EC32FAD}"/>
+              </a:ext>
+            </a:extLst>
+          </p:cNvPr>
+          <p:cNvSpPr/>
+          <p:nvPr/>
+        </p:nvSpPr>
+        <p:spPr>
+          <a:xfrm>
+            <a:off x="1961722" y="4259456"/>
+            <a:ext cx="3216205" cy="351317"/>
+          </a:xfrm>
+          <a:prstGeom prst="rect">
+            <a:avLst/>
+          </a:prstGeom>
+          <a:noFill/>
+          <a:ln w="28575">
+            <a:solidFill>
+              <a:schemeClr val="accent1"/>
+            </a:solidFill>
+          </a:ln>
+        </p:spPr>
+        <p:style>
+          <a:lnRef idx="2">
+            <a:schemeClr val="accent1">
+              <a:shade val="50000"/>
+            </a:schemeClr>
+          </a:lnRef>
+          <a:fillRef idx="1">
+            <a:schemeClr val="accent1"/>
+          </a:fillRef>
+          <a:effectRef idx="0">
+            <a:schemeClr val="accent1"/>
+          </a:effectRef>
+          <a:fontRef idx="minor">
+            <a:schemeClr val="lt1"/>
+          </a:fontRef>
+        </p:style>
+        <p:txBody>
+          <a:bodyPr rtlCol="0" anchor="ctr"/>
+          <a:lstStyle/>
+          <a:p>
+            <a:pPr algn="ctr"/>
+            <a:endParaRPr lang="de-DE"/>
+          </a:p>
+        </p:txBody>
+      </p:sp>
     </p:spTree>
     <p:extLst>
       <p:ext uri="{BB962C8B-B14F-4D97-AF65-F5344CB8AC3E}">
-        <p14:creationId xmlns:p14="http://schemas.microsoft.com/office/powerpoint/2010/main" val="2637983416"/>
+        <p14:creationId xmlns:p14="http://schemas.microsoft.com/office/powerpoint/2010/main" val="2656979585"/>
       </p:ext>
     </p:extLst>
   </p:cSld>
@@ -16096,7 +16767,7 @@
           <a:p>
             <a:fld id="{D3F43C91-2841-4495-8685-AEB6BC46864F}" type="datetime1">
               <a:rPr lang="de-DE" smtClean="0"/>
-              <a:t>29.09.2021</a:t>
+              <a:t>30.09.2021</a:t>
             </a:fld>
             <a:endParaRPr lang="de-DE"/>
           </a:p>
@@ -16433,7 +17104,13 @@
       </p:grpSpPr>
       <p:sp>
         <p:nvSpPr>
-          <p:cNvPr id="4" name="Titel 3"/>
+          <p:cNvPr id="2" name="Titel 1">
+            <a:extLst>
+              <a:ext uri="{FF2B5EF4-FFF2-40B4-BE49-F238E27FC236}">
+                <a16:creationId xmlns:a16="http://schemas.microsoft.com/office/drawing/2014/main" id="{8DF454F3-4497-451A-AC54-789CCA2590C9}"/>
+              </a:ext>
+            </a:extLst>
+          </p:cNvPr>
           <p:cNvSpPr>
             <a:spLocks noGrp="1"/>
           </p:cNvSpPr>
@@ -16448,14 +17125,53 @@
           <a:p>
             <a:r>
               <a:rPr lang="de-DE" dirty="0"/>
-              <a:t>Fragen</a:t>
-            </a:r>
-          </a:p>
-        </p:txBody>
-      </p:sp>
-      <p:sp>
-        <p:nvSpPr>
-          <p:cNvPr id="2" name="Datumsplatzhalter 1"/>
+              <a:t>Virtuelles Gerät anlegen</a:t>
+            </a:r>
+          </a:p>
+        </p:txBody>
+      </p:sp>
+      <p:sp>
+        <p:nvSpPr>
+          <p:cNvPr id="3" name="Inhaltsplatzhalter 2">
+            <a:extLst>
+              <a:ext uri="{FF2B5EF4-FFF2-40B4-BE49-F238E27FC236}">
+                <a16:creationId xmlns:a16="http://schemas.microsoft.com/office/drawing/2014/main" id="{86853F22-14DF-4817-8443-4B52B8CC22AF}"/>
+              </a:ext>
+            </a:extLst>
+          </p:cNvPr>
+          <p:cNvSpPr>
+            <a:spLocks noGrp="1"/>
+          </p:cNvSpPr>
+          <p:nvPr>
+            <p:ph idx="1"/>
+          </p:nvPr>
+        </p:nvSpPr>
+        <p:spPr>
+          <a:xfrm>
+            <a:off x="838200" y="1520825"/>
+            <a:ext cx="11004933" cy="4645025"/>
+          </a:xfrm>
+        </p:spPr>
+        <p:txBody>
+          <a:bodyPr/>
+          <a:lstStyle/>
+          <a:p>
+            <a:r>
+              <a:rPr lang="de-DE" dirty="0"/>
+              <a:t>Android Version aussuchen, evtl. gleiche Version wie auf Eurem Phone</a:t>
+            </a:r>
+          </a:p>
+        </p:txBody>
+      </p:sp>
+      <p:sp>
+        <p:nvSpPr>
+          <p:cNvPr id="4" name="Datumsplatzhalter 3">
+            <a:extLst>
+              <a:ext uri="{FF2B5EF4-FFF2-40B4-BE49-F238E27FC236}">
+                <a16:creationId xmlns:a16="http://schemas.microsoft.com/office/drawing/2014/main" id="{80EDBEE7-F95A-4152-9979-6A8847127CE3}"/>
+              </a:ext>
+            </a:extLst>
+          </p:cNvPr>
           <p:cNvSpPr>
             <a:spLocks noGrp="1"/>
           </p:cNvSpPr>
@@ -16468,9 +17184,9 @@
           <a:bodyPr/>
           <a:lstStyle/>
           <a:p>
-            <a:fld id="{29F03F87-5FC1-454A-B924-57348B963929}" type="datetime1">
+            <a:fld id="{DAFA5E08-56C4-4D00-93E8-8E8047A8DE89}" type="datetime1">
               <a:rPr lang="de-DE" smtClean="0"/>
-              <a:t>29.09.2021</a:t>
+              <a:t>30.09.2021</a:t>
             </a:fld>
             <a:endParaRPr lang="de-DE"/>
           </a:p>
@@ -16478,7 +17194,13 @@
       </p:sp>
       <p:sp>
         <p:nvSpPr>
-          <p:cNvPr id="3" name="Fußzeilenplatzhalter 2"/>
+          <p:cNvPr id="5" name="Fußzeilenplatzhalter 4">
+            <a:extLst>
+              <a:ext uri="{FF2B5EF4-FFF2-40B4-BE49-F238E27FC236}">
+                <a16:creationId xmlns:a16="http://schemas.microsoft.com/office/drawing/2014/main" id="{B9438231-66E5-4D5F-BE6F-9468D9CB05DF}"/>
+              </a:ext>
+            </a:extLst>
+          </p:cNvPr>
           <p:cNvSpPr>
             <a:spLocks noGrp="1"/>
           </p:cNvSpPr>
@@ -16500,7 +17222,13 @@
       </p:sp>
       <p:sp>
         <p:nvSpPr>
-          <p:cNvPr id="6" name="Foliennummernplatzhalter 5"/>
+          <p:cNvPr id="6" name="Foliennummernplatzhalter 5">
+            <a:extLst>
+              <a:ext uri="{FF2B5EF4-FFF2-40B4-BE49-F238E27FC236}">
+                <a16:creationId xmlns:a16="http://schemas.microsoft.com/office/drawing/2014/main" id="{C3BEA64F-3A50-4353-B3BD-9C9392B1AF78}"/>
+              </a:ext>
+            </a:extLst>
+          </p:cNvPr>
           <p:cNvSpPr>
             <a:spLocks noGrp="1"/>
           </p:cNvSpPr>
@@ -16516,6 +17244,2222 @@
             <a:fld id="{3A1F27E2-D58A-4028-9FF2-B12D897F257E}" type="slidenum">
               <a:rPr lang="de-DE" smtClean="0"/>
               <a:t>40</a:t>
+            </a:fld>
+            <a:endParaRPr lang="de-DE"/>
+          </a:p>
+        </p:txBody>
+      </p:sp>
+      <p:pic>
+        <p:nvPicPr>
+          <p:cNvPr id="8" name="Grafik 7">
+            <a:extLst>
+              <a:ext uri="{FF2B5EF4-FFF2-40B4-BE49-F238E27FC236}">
+                <a16:creationId xmlns:a16="http://schemas.microsoft.com/office/drawing/2014/main" id="{813CDD06-B5BD-49BD-AB1B-0033BEEF5DD0}"/>
+              </a:ext>
+            </a:extLst>
+          </p:cNvPr>
+          <p:cNvPicPr>
+            <a:picLocks noChangeAspect="1"/>
+          </p:cNvPicPr>
+          <p:nvPr/>
+        </p:nvPicPr>
+        <p:blipFill>
+          <a:blip r:embed="rId3"/>
+          <a:stretch>
+            <a:fillRect/>
+          </a:stretch>
+        </p:blipFill>
+        <p:spPr>
+          <a:xfrm>
+            <a:off x="1178806" y="1946736"/>
+            <a:ext cx="6764356" cy="4221822"/>
+          </a:xfrm>
+          <a:prstGeom prst="rect">
+            <a:avLst/>
+          </a:prstGeom>
+        </p:spPr>
+      </p:pic>
+      <p:sp>
+        <p:nvSpPr>
+          <p:cNvPr id="9" name="Rechteck 8">
+            <a:extLst>
+              <a:ext uri="{FF2B5EF4-FFF2-40B4-BE49-F238E27FC236}">
+                <a16:creationId xmlns:a16="http://schemas.microsoft.com/office/drawing/2014/main" id="{79276152-E2E5-4A9A-A037-92B89AD3EC4E}"/>
+              </a:ext>
+            </a:extLst>
+          </p:cNvPr>
+          <p:cNvSpPr/>
+          <p:nvPr/>
+        </p:nvSpPr>
+        <p:spPr>
+          <a:xfrm>
+            <a:off x="1344779" y="4347591"/>
+            <a:ext cx="3733997" cy="351317"/>
+          </a:xfrm>
+          <a:prstGeom prst="rect">
+            <a:avLst/>
+          </a:prstGeom>
+          <a:noFill/>
+          <a:ln w="28575">
+            <a:solidFill>
+              <a:schemeClr val="accent1"/>
+            </a:solidFill>
+          </a:ln>
+        </p:spPr>
+        <p:style>
+          <a:lnRef idx="2">
+            <a:schemeClr val="accent1">
+              <a:shade val="50000"/>
+            </a:schemeClr>
+          </a:lnRef>
+          <a:fillRef idx="1">
+            <a:schemeClr val="accent1"/>
+          </a:fillRef>
+          <a:effectRef idx="0">
+            <a:schemeClr val="accent1"/>
+          </a:effectRef>
+          <a:fontRef idx="minor">
+            <a:schemeClr val="lt1"/>
+          </a:fontRef>
+        </p:style>
+        <p:txBody>
+          <a:bodyPr rtlCol="0" anchor="ctr"/>
+          <a:lstStyle/>
+          <a:p>
+            <a:pPr algn="ctr"/>
+            <a:endParaRPr lang="de-DE"/>
+          </a:p>
+        </p:txBody>
+      </p:sp>
+    </p:spTree>
+    <p:extLst>
+      <p:ext uri="{BB962C8B-B14F-4D97-AF65-F5344CB8AC3E}">
+        <p14:creationId xmlns:p14="http://schemas.microsoft.com/office/powerpoint/2010/main" val="1132027860"/>
+      </p:ext>
+    </p:extLst>
+  </p:cSld>
+  <p:clrMapOvr>
+    <a:masterClrMapping/>
+  </p:clrMapOvr>
+</p:sld>
+</file>
+
+<file path=ppt/slides/slide41.xml><?xml version="1.0" encoding="utf-8"?>
+<p:sld xmlns:a="http://schemas.openxmlformats.org/drawingml/2006/main" xmlns:r="http://schemas.openxmlformats.org/officeDocument/2006/relationships" xmlns:p="http://schemas.openxmlformats.org/presentationml/2006/main">
+  <p:cSld>
+    <p:spTree>
+      <p:nvGrpSpPr>
+        <p:cNvPr id="1" name=""/>
+        <p:cNvGrpSpPr/>
+        <p:nvPr/>
+      </p:nvGrpSpPr>
+      <p:grpSpPr>
+        <a:xfrm>
+          <a:off x="0" y="0"/>
+          <a:ext cx="0" cy="0"/>
+          <a:chOff x="0" y="0"/>
+          <a:chExt cx="0" cy="0"/>
+        </a:xfrm>
+      </p:grpSpPr>
+      <p:sp>
+        <p:nvSpPr>
+          <p:cNvPr id="2" name="Titel 1">
+            <a:extLst>
+              <a:ext uri="{FF2B5EF4-FFF2-40B4-BE49-F238E27FC236}">
+                <a16:creationId xmlns:a16="http://schemas.microsoft.com/office/drawing/2014/main" id="{0CB06ECF-1513-49AA-9F88-B06B02271295}"/>
+              </a:ext>
+            </a:extLst>
+          </p:cNvPr>
+          <p:cNvSpPr>
+            <a:spLocks noGrp="1"/>
+          </p:cNvSpPr>
+          <p:nvPr>
+            <p:ph type="title"/>
+          </p:nvPr>
+        </p:nvSpPr>
+        <p:spPr/>
+        <p:txBody>
+          <a:bodyPr/>
+          <a:lstStyle/>
+          <a:p>
+            <a:r>
+              <a:rPr lang="de-DE" dirty="0"/>
+              <a:t>Virtuelles Gerät anlegen</a:t>
+            </a:r>
+          </a:p>
+        </p:txBody>
+      </p:sp>
+      <p:sp>
+        <p:nvSpPr>
+          <p:cNvPr id="3" name="Inhaltsplatzhalter 2">
+            <a:extLst>
+              <a:ext uri="{FF2B5EF4-FFF2-40B4-BE49-F238E27FC236}">
+                <a16:creationId xmlns:a16="http://schemas.microsoft.com/office/drawing/2014/main" id="{78FDEB00-1B53-4BDA-8482-84D18CD32E31}"/>
+              </a:ext>
+            </a:extLst>
+          </p:cNvPr>
+          <p:cNvSpPr>
+            <a:spLocks noGrp="1"/>
+          </p:cNvSpPr>
+          <p:nvPr>
+            <p:ph idx="1"/>
+          </p:nvPr>
+        </p:nvSpPr>
+        <p:spPr/>
+        <p:txBody>
+          <a:bodyPr/>
+          <a:lstStyle/>
+          <a:p>
+            <a:r>
+              <a:rPr lang="de-DE" dirty="0"/>
+              <a:t>Warten, Finish</a:t>
+            </a:r>
+          </a:p>
+        </p:txBody>
+      </p:sp>
+      <p:sp>
+        <p:nvSpPr>
+          <p:cNvPr id="4" name="Datumsplatzhalter 3">
+            <a:extLst>
+              <a:ext uri="{FF2B5EF4-FFF2-40B4-BE49-F238E27FC236}">
+                <a16:creationId xmlns:a16="http://schemas.microsoft.com/office/drawing/2014/main" id="{749C8C97-BA0C-4DA9-88AC-BE1722F3E071}"/>
+              </a:ext>
+            </a:extLst>
+          </p:cNvPr>
+          <p:cNvSpPr>
+            <a:spLocks noGrp="1"/>
+          </p:cNvSpPr>
+          <p:nvPr>
+            <p:ph type="dt" sz="half" idx="10"/>
+          </p:nvPr>
+        </p:nvSpPr>
+        <p:spPr/>
+        <p:txBody>
+          <a:bodyPr/>
+          <a:lstStyle/>
+          <a:p>
+            <a:fld id="{DAFA5E08-56C4-4D00-93E8-8E8047A8DE89}" type="datetime1">
+              <a:rPr lang="de-DE" smtClean="0"/>
+              <a:t>30.09.2021</a:t>
+            </a:fld>
+            <a:endParaRPr lang="de-DE"/>
+          </a:p>
+        </p:txBody>
+      </p:sp>
+      <p:sp>
+        <p:nvSpPr>
+          <p:cNvPr id="5" name="Fußzeilenplatzhalter 4">
+            <a:extLst>
+              <a:ext uri="{FF2B5EF4-FFF2-40B4-BE49-F238E27FC236}">
+                <a16:creationId xmlns:a16="http://schemas.microsoft.com/office/drawing/2014/main" id="{C8A8652E-68DB-4BE0-91A9-FCF6EA95856D}"/>
+              </a:ext>
+            </a:extLst>
+          </p:cNvPr>
+          <p:cNvSpPr>
+            <a:spLocks noGrp="1"/>
+          </p:cNvSpPr>
+          <p:nvPr>
+            <p:ph type="ftr" sz="quarter" idx="11"/>
+          </p:nvPr>
+        </p:nvSpPr>
+        <p:spPr/>
+        <p:txBody>
+          <a:bodyPr/>
+          <a:lstStyle/>
+          <a:p>
+            <a:r>
+              <a:rPr lang="de-DE"/>
+              <a:t>Android Studio</a:t>
+            </a:r>
+          </a:p>
+        </p:txBody>
+      </p:sp>
+      <p:sp>
+        <p:nvSpPr>
+          <p:cNvPr id="6" name="Foliennummernplatzhalter 5">
+            <a:extLst>
+              <a:ext uri="{FF2B5EF4-FFF2-40B4-BE49-F238E27FC236}">
+                <a16:creationId xmlns:a16="http://schemas.microsoft.com/office/drawing/2014/main" id="{F99D947A-0299-46F6-B833-DAB23DA60E8F}"/>
+              </a:ext>
+            </a:extLst>
+          </p:cNvPr>
+          <p:cNvSpPr>
+            <a:spLocks noGrp="1"/>
+          </p:cNvSpPr>
+          <p:nvPr>
+            <p:ph type="sldNum" sz="quarter" idx="12"/>
+          </p:nvPr>
+        </p:nvSpPr>
+        <p:spPr/>
+        <p:txBody>
+          <a:bodyPr/>
+          <a:lstStyle/>
+          <a:p>
+            <a:fld id="{3A1F27E2-D58A-4028-9FF2-B12D897F257E}" type="slidenum">
+              <a:rPr lang="de-DE" smtClean="0"/>
+              <a:t>41</a:t>
+            </a:fld>
+            <a:endParaRPr lang="de-DE"/>
+          </a:p>
+        </p:txBody>
+      </p:sp>
+      <p:pic>
+        <p:nvPicPr>
+          <p:cNvPr id="8" name="Grafik 7">
+            <a:extLst>
+              <a:ext uri="{FF2B5EF4-FFF2-40B4-BE49-F238E27FC236}">
+                <a16:creationId xmlns:a16="http://schemas.microsoft.com/office/drawing/2014/main" id="{0E385604-59D7-4DEB-9C60-32646B4B499F}"/>
+              </a:ext>
+            </a:extLst>
+          </p:cNvPr>
+          <p:cNvPicPr>
+            <a:picLocks noChangeAspect="1"/>
+          </p:cNvPicPr>
+          <p:nvPr/>
+        </p:nvPicPr>
+        <p:blipFill>
+          <a:blip r:embed="rId2"/>
+          <a:stretch>
+            <a:fillRect/>
+          </a:stretch>
+        </p:blipFill>
+        <p:spPr>
+          <a:xfrm>
+            <a:off x="838200" y="2219391"/>
+            <a:ext cx="5408364" cy="3946459"/>
+          </a:xfrm>
+          <a:prstGeom prst="rect">
+            <a:avLst/>
+          </a:prstGeom>
+        </p:spPr>
+      </p:pic>
+      <p:sp>
+        <p:nvSpPr>
+          <p:cNvPr id="9" name="Rechteck 8">
+            <a:extLst>
+              <a:ext uri="{FF2B5EF4-FFF2-40B4-BE49-F238E27FC236}">
+                <a16:creationId xmlns:a16="http://schemas.microsoft.com/office/drawing/2014/main" id="{EEE995E0-A763-49AE-8B68-65D7FFE0DBC4}"/>
+              </a:ext>
+            </a:extLst>
+          </p:cNvPr>
+          <p:cNvSpPr/>
+          <p:nvPr/>
+        </p:nvSpPr>
+        <p:spPr>
+          <a:xfrm>
+            <a:off x="5508434" y="5814533"/>
+            <a:ext cx="738130" cy="351317"/>
+          </a:xfrm>
+          <a:prstGeom prst="rect">
+            <a:avLst/>
+          </a:prstGeom>
+          <a:noFill/>
+          <a:ln w="28575">
+            <a:solidFill>
+              <a:schemeClr val="accent1"/>
+            </a:solidFill>
+          </a:ln>
+        </p:spPr>
+        <p:style>
+          <a:lnRef idx="2">
+            <a:schemeClr val="accent1">
+              <a:shade val="50000"/>
+            </a:schemeClr>
+          </a:lnRef>
+          <a:fillRef idx="1">
+            <a:schemeClr val="accent1"/>
+          </a:fillRef>
+          <a:effectRef idx="0">
+            <a:schemeClr val="accent1"/>
+          </a:effectRef>
+          <a:fontRef idx="minor">
+            <a:schemeClr val="lt1"/>
+          </a:fontRef>
+        </p:style>
+        <p:txBody>
+          <a:bodyPr rtlCol="0" anchor="ctr"/>
+          <a:lstStyle/>
+          <a:p>
+            <a:pPr algn="ctr"/>
+            <a:endParaRPr lang="de-DE"/>
+          </a:p>
+        </p:txBody>
+      </p:sp>
+    </p:spTree>
+    <p:extLst>
+      <p:ext uri="{BB962C8B-B14F-4D97-AF65-F5344CB8AC3E}">
+        <p14:creationId xmlns:p14="http://schemas.microsoft.com/office/powerpoint/2010/main" val="1868199305"/>
+      </p:ext>
+    </p:extLst>
+  </p:cSld>
+  <p:clrMapOvr>
+    <a:masterClrMapping/>
+  </p:clrMapOvr>
+</p:sld>
+</file>
+
+<file path=ppt/slides/slide42.xml><?xml version="1.0" encoding="utf-8"?>
+<p:sld xmlns:a="http://schemas.openxmlformats.org/drawingml/2006/main" xmlns:r="http://schemas.openxmlformats.org/officeDocument/2006/relationships" xmlns:p="http://schemas.openxmlformats.org/presentationml/2006/main">
+  <p:cSld>
+    <p:spTree>
+      <p:nvGrpSpPr>
+        <p:cNvPr id="1" name=""/>
+        <p:cNvGrpSpPr/>
+        <p:nvPr/>
+      </p:nvGrpSpPr>
+      <p:grpSpPr>
+        <a:xfrm>
+          <a:off x="0" y="0"/>
+          <a:ext cx="0" cy="0"/>
+          <a:chOff x="0" y="0"/>
+          <a:chExt cx="0" cy="0"/>
+        </a:xfrm>
+      </p:grpSpPr>
+      <p:sp>
+        <p:nvSpPr>
+          <p:cNvPr id="2" name="Titel 1">
+            <a:extLst>
+              <a:ext uri="{FF2B5EF4-FFF2-40B4-BE49-F238E27FC236}">
+                <a16:creationId xmlns:a16="http://schemas.microsoft.com/office/drawing/2014/main" id="{17BEC33B-94E9-44FF-8274-4B9A33CB9BE7}"/>
+              </a:ext>
+            </a:extLst>
+          </p:cNvPr>
+          <p:cNvSpPr>
+            <a:spLocks noGrp="1"/>
+          </p:cNvSpPr>
+          <p:nvPr>
+            <p:ph type="title"/>
+          </p:nvPr>
+        </p:nvSpPr>
+        <p:spPr/>
+        <p:txBody>
+          <a:bodyPr/>
+          <a:lstStyle/>
+          <a:p>
+            <a:r>
+              <a:rPr lang="de-DE" dirty="0"/>
+              <a:t>Virtuelles Gerät anlegen</a:t>
+            </a:r>
+          </a:p>
+        </p:txBody>
+      </p:sp>
+      <p:sp>
+        <p:nvSpPr>
+          <p:cNvPr id="3" name="Inhaltsplatzhalter 2">
+            <a:extLst>
+              <a:ext uri="{FF2B5EF4-FFF2-40B4-BE49-F238E27FC236}">
+                <a16:creationId xmlns:a16="http://schemas.microsoft.com/office/drawing/2014/main" id="{41BA17CF-99F6-4CED-9A83-2D038437896F}"/>
+              </a:ext>
+            </a:extLst>
+          </p:cNvPr>
+          <p:cNvSpPr>
+            <a:spLocks noGrp="1"/>
+          </p:cNvSpPr>
+          <p:nvPr>
+            <p:ph idx="1"/>
+          </p:nvPr>
+        </p:nvSpPr>
+        <p:spPr/>
+        <p:txBody>
+          <a:bodyPr/>
+          <a:lstStyle/>
+          <a:p>
+            <a:r>
+              <a:rPr lang="de-DE" dirty="0"/>
+              <a:t>Android Version selektieren</a:t>
+            </a:r>
+          </a:p>
+        </p:txBody>
+      </p:sp>
+      <p:sp>
+        <p:nvSpPr>
+          <p:cNvPr id="4" name="Datumsplatzhalter 3">
+            <a:extLst>
+              <a:ext uri="{FF2B5EF4-FFF2-40B4-BE49-F238E27FC236}">
+                <a16:creationId xmlns:a16="http://schemas.microsoft.com/office/drawing/2014/main" id="{2EADB003-E907-497A-A332-D95676EDE97B}"/>
+              </a:ext>
+            </a:extLst>
+          </p:cNvPr>
+          <p:cNvSpPr>
+            <a:spLocks noGrp="1"/>
+          </p:cNvSpPr>
+          <p:nvPr>
+            <p:ph type="dt" sz="half" idx="10"/>
+          </p:nvPr>
+        </p:nvSpPr>
+        <p:spPr/>
+        <p:txBody>
+          <a:bodyPr/>
+          <a:lstStyle/>
+          <a:p>
+            <a:fld id="{DAFA5E08-56C4-4D00-93E8-8E8047A8DE89}" type="datetime1">
+              <a:rPr lang="de-DE" smtClean="0"/>
+              <a:t>30.09.2021</a:t>
+            </a:fld>
+            <a:endParaRPr lang="de-DE"/>
+          </a:p>
+        </p:txBody>
+      </p:sp>
+      <p:sp>
+        <p:nvSpPr>
+          <p:cNvPr id="5" name="Fußzeilenplatzhalter 4">
+            <a:extLst>
+              <a:ext uri="{FF2B5EF4-FFF2-40B4-BE49-F238E27FC236}">
+                <a16:creationId xmlns:a16="http://schemas.microsoft.com/office/drawing/2014/main" id="{4ADFBC2A-2B94-41EF-A7E5-67798723C6D0}"/>
+              </a:ext>
+            </a:extLst>
+          </p:cNvPr>
+          <p:cNvSpPr>
+            <a:spLocks noGrp="1"/>
+          </p:cNvSpPr>
+          <p:nvPr>
+            <p:ph type="ftr" sz="quarter" idx="11"/>
+          </p:nvPr>
+        </p:nvSpPr>
+        <p:spPr/>
+        <p:txBody>
+          <a:bodyPr/>
+          <a:lstStyle/>
+          <a:p>
+            <a:r>
+              <a:rPr lang="de-DE"/>
+              <a:t>Android Studio</a:t>
+            </a:r>
+          </a:p>
+        </p:txBody>
+      </p:sp>
+      <p:sp>
+        <p:nvSpPr>
+          <p:cNvPr id="6" name="Foliennummernplatzhalter 5">
+            <a:extLst>
+              <a:ext uri="{FF2B5EF4-FFF2-40B4-BE49-F238E27FC236}">
+                <a16:creationId xmlns:a16="http://schemas.microsoft.com/office/drawing/2014/main" id="{B694AD4A-76F5-4E5E-99D9-BB1DB239D465}"/>
+              </a:ext>
+            </a:extLst>
+          </p:cNvPr>
+          <p:cNvSpPr>
+            <a:spLocks noGrp="1"/>
+          </p:cNvSpPr>
+          <p:nvPr>
+            <p:ph type="sldNum" sz="quarter" idx="12"/>
+          </p:nvPr>
+        </p:nvSpPr>
+        <p:spPr/>
+        <p:txBody>
+          <a:bodyPr/>
+          <a:lstStyle/>
+          <a:p>
+            <a:fld id="{3A1F27E2-D58A-4028-9FF2-B12D897F257E}" type="slidenum">
+              <a:rPr lang="de-DE" smtClean="0"/>
+              <a:t>42</a:t>
+            </a:fld>
+            <a:endParaRPr lang="de-DE"/>
+          </a:p>
+        </p:txBody>
+      </p:sp>
+      <p:pic>
+        <p:nvPicPr>
+          <p:cNvPr id="8" name="Grafik 7">
+            <a:extLst>
+              <a:ext uri="{FF2B5EF4-FFF2-40B4-BE49-F238E27FC236}">
+                <a16:creationId xmlns:a16="http://schemas.microsoft.com/office/drawing/2014/main" id="{41F1FEFA-CF75-4BC4-AF35-1F18060CCB9C}"/>
+              </a:ext>
+            </a:extLst>
+          </p:cNvPr>
+          <p:cNvPicPr>
+            <a:picLocks noChangeAspect="1"/>
+          </p:cNvPicPr>
+          <p:nvPr/>
+        </p:nvPicPr>
+        <p:blipFill>
+          <a:blip r:embed="rId2"/>
+          <a:stretch>
+            <a:fillRect/>
+          </a:stretch>
+        </p:blipFill>
+        <p:spPr>
+          <a:xfrm>
+            <a:off x="838200" y="2051083"/>
+            <a:ext cx="6592830" cy="4114767"/>
+          </a:xfrm>
+          <a:prstGeom prst="rect">
+            <a:avLst/>
+          </a:prstGeom>
+        </p:spPr>
+      </p:pic>
+      <p:sp>
+        <p:nvSpPr>
+          <p:cNvPr id="9" name="Rechteck 8">
+            <a:extLst>
+              <a:ext uri="{FF2B5EF4-FFF2-40B4-BE49-F238E27FC236}">
+                <a16:creationId xmlns:a16="http://schemas.microsoft.com/office/drawing/2014/main" id="{D0472EDB-F30E-4DA4-B0F4-FC9CAB6EF889}"/>
+              </a:ext>
+            </a:extLst>
+          </p:cNvPr>
+          <p:cNvSpPr/>
+          <p:nvPr/>
+        </p:nvSpPr>
+        <p:spPr>
+          <a:xfrm>
+            <a:off x="5547730" y="5814533"/>
+            <a:ext cx="892366" cy="351317"/>
+          </a:xfrm>
+          <a:prstGeom prst="rect">
+            <a:avLst/>
+          </a:prstGeom>
+          <a:noFill/>
+          <a:ln w="28575">
+            <a:solidFill>
+              <a:schemeClr val="accent1"/>
+            </a:solidFill>
+          </a:ln>
+        </p:spPr>
+        <p:style>
+          <a:lnRef idx="2">
+            <a:schemeClr val="accent1">
+              <a:shade val="50000"/>
+            </a:schemeClr>
+          </a:lnRef>
+          <a:fillRef idx="1">
+            <a:schemeClr val="accent1"/>
+          </a:fillRef>
+          <a:effectRef idx="0">
+            <a:schemeClr val="accent1"/>
+          </a:effectRef>
+          <a:fontRef idx="minor">
+            <a:schemeClr val="lt1"/>
+          </a:fontRef>
+        </p:style>
+        <p:txBody>
+          <a:bodyPr rtlCol="0" anchor="ctr"/>
+          <a:lstStyle/>
+          <a:p>
+            <a:pPr algn="ctr"/>
+            <a:endParaRPr lang="de-DE"/>
+          </a:p>
+        </p:txBody>
+      </p:sp>
+    </p:spTree>
+    <p:extLst>
+      <p:ext uri="{BB962C8B-B14F-4D97-AF65-F5344CB8AC3E}">
+        <p14:creationId xmlns:p14="http://schemas.microsoft.com/office/powerpoint/2010/main" val="470416831"/>
+      </p:ext>
+    </p:extLst>
+  </p:cSld>
+  <p:clrMapOvr>
+    <a:masterClrMapping/>
+  </p:clrMapOvr>
+</p:sld>
+</file>
+
+<file path=ppt/slides/slide43.xml><?xml version="1.0" encoding="utf-8"?>
+<p:sld xmlns:a="http://schemas.openxmlformats.org/drawingml/2006/main" xmlns:r="http://schemas.openxmlformats.org/officeDocument/2006/relationships" xmlns:p="http://schemas.openxmlformats.org/presentationml/2006/main">
+  <p:cSld>
+    <p:spTree>
+      <p:nvGrpSpPr>
+        <p:cNvPr id="1" name=""/>
+        <p:cNvGrpSpPr/>
+        <p:nvPr/>
+      </p:nvGrpSpPr>
+      <p:grpSpPr>
+        <a:xfrm>
+          <a:off x="0" y="0"/>
+          <a:ext cx="0" cy="0"/>
+          <a:chOff x="0" y="0"/>
+          <a:chExt cx="0" cy="0"/>
+        </a:xfrm>
+      </p:grpSpPr>
+      <p:sp>
+        <p:nvSpPr>
+          <p:cNvPr id="2" name="Titel 1">
+            <a:extLst>
+              <a:ext uri="{FF2B5EF4-FFF2-40B4-BE49-F238E27FC236}">
+                <a16:creationId xmlns:a16="http://schemas.microsoft.com/office/drawing/2014/main" id="{9622A451-64BF-476F-B587-9257A8C1FD0A}"/>
+              </a:ext>
+            </a:extLst>
+          </p:cNvPr>
+          <p:cNvSpPr>
+            <a:spLocks noGrp="1"/>
+          </p:cNvSpPr>
+          <p:nvPr>
+            <p:ph type="title"/>
+          </p:nvPr>
+        </p:nvSpPr>
+        <p:spPr/>
+        <p:txBody>
+          <a:bodyPr/>
+          <a:lstStyle/>
+          <a:p>
+            <a:r>
+              <a:rPr lang="de-DE" dirty="0"/>
+              <a:t>Virtuelles Gerät anlegen</a:t>
+            </a:r>
+          </a:p>
+        </p:txBody>
+      </p:sp>
+      <p:sp>
+        <p:nvSpPr>
+          <p:cNvPr id="3" name="Inhaltsplatzhalter 2">
+            <a:extLst>
+              <a:ext uri="{FF2B5EF4-FFF2-40B4-BE49-F238E27FC236}">
+                <a16:creationId xmlns:a16="http://schemas.microsoft.com/office/drawing/2014/main" id="{63CCB5D6-5F74-4559-83B8-730EC00B7EAB}"/>
+              </a:ext>
+            </a:extLst>
+          </p:cNvPr>
+          <p:cNvSpPr>
+            <a:spLocks noGrp="1"/>
+          </p:cNvSpPr>
+          <p:nvPr>
+            <p:ph idx="1"/>
+          </p:nvPr>
+        </p:nvSpPr>
+        <p:spPr/>
+        <p:txBody>
+          <a:bodyPr/>
+          <a:lstStyle/>
+          <a:p>
+            <a:r>
+              <a:rPr lang="de-DE" dirty="0"/>
+              <a:t>Ausrichtung wählen</a:t>
+            </a:r>
+          </a:p>
+        </p:txBody>
+      </p:sp>
+      <p:sp>
+        <p:nvSpPr>
+          <p:cNvPr id="4" name="Datumsplatzhalter 3">
+            <a:extLst>
+              <a:ext uri="{FF2B5EF4-FFF2-40B4-BE49-F238E27FC236}">
+                <a16:creationId xmlns:a16="http://schemas.microsoft.com/office/drawing/2014/main" id="{8525DD59-D41F-4AA6-B700-5B33F5E5E268}"/>
+              </a:ext>
+            </a:extLst>
+          </p:cNvPr>
+          <p:cNvSpPr>
+            <a:spLocks noGrp="1"/>
+          </p:cNvSpPr>
+          <p:nvPr>
+            <p:ph type="dt" sz="half" idx="10"/>
+          </p:nvPr>
+        </p:nvSpPr>
+        <p:spPr/>
+        <p:txBody>
+          <a:bodyPr/>
+          <a:lstStyle/>
+          <a:p>
+            <a:fld id="{DAFA5E08-56C4-4D00-93E8-8E8047A8DE89}" type="datetime1">
+              <a:rPr lang="de-DE" smtClean="0"/>
+              <a:t>30.09.2021</a:t>
+            </a:fld>
+            <a:endParaRPr lang="de-DE"/>
+          </a:p>
+        </p:txBody>
+      </p:sp>
+      <p:sp>
+        <p:nvSpPr>
+          <p:cNvPr id="5" name="Fußzeilenplatzhalter 4">
+            <a:extLst>
+              <a:ext uri="{FF2B5EF4-FFF2-40B4-BE49-F238E27FC236}">
+                <a16:creationId xmlns:a16="http://schemas.microsoft.com/office/drawing/2014/main" id="{D5D2FE9C-F4D0-4E00-A71B-F5879C369226}"/>
+              </a:ext>
+            </a:extLst>
+          </p:cNvPr>
+          <p:cNvSpPr>
+            <a:spLocks noGrp="1"/>
+          </p:cNvSpPr>
+          <p:nvPr>
+            <p:ph type="ftr" sz="quarter" idx="11"/>
+          </p:nvPr>
+        </p:nvSpPr>
+        <p:spPr/>
+        <p:txBody>
+          <a:bodyPr/>
+          <a:lstStyle/>
+          <a:p>
+            <a:r>
+              <a:rPr lang="de-DE"/>
+              <a:t>Android Studio</a:t>
+            </a:r>
+          </a:p>
+        </p:txBody>
+      </p:sp>
+      <p:sp>
+        <p:nvSpPr>
+          <p:cNvPr id="6" name="Foliennummernplatzhalter 5">
+            <a:extLst>
+              <a:ext uri="{FF2B5EF4-FFF2-40B4-BE49-F238E27FC236}">
+                <a16:creationId xmlns:a16="http://schemas.microsoft.com/office/drawing/2014/main" id="{E3B2A07C-28E6-4363-88DB-51E2410D266C}"/>
+              </a:ext>
+            </a:extLst>
+          </p:cNvPr>
+          <p:cNvSpPr>
+            <a:spLocks noGrp="1"/>
+          </p:cNvSpPr>
+          <p:nvPr>
+            <p:ph type="sldNum" sz="quarter" idx="12"/>
+          </p:nvPr>
+        </p:nvSpPr>
+        <p:spPr/>
+        <p:txBody>
+          <a:bodyPr/>
+          <a:lstStyle/>
+          <a:p>
+            <a:fld id="{3A1F27E2-D58A-4028-9FF2-B12D897F257E}" type="slidenum">
+              <a:rPr lang="de-DE" smtClean="0"/>
+              <a:t>43</a:t>
+            </a:fld>
+            <a:endParaRPr lang="de-DE"/>
+          </a:p>
+        </p:txBody>
+      </p:sp>
+      <p:pic>
+        <p:nvPicPr>
+          <p:cNvPr id="8" name="Grafik 7">
+            <a:extLst>
+              <a:ext uri="{FF2B5EF4-FFF2-40B4-BE49-F238E27FC236}">
+                <a16:creationId xmlns:a16="http://schemas.microsoft.com/office/drawing/2014/main" id="{8BA1EAD2-0B65-492B-9263-E4417983ABB9}"/>
+              </a:ext>
+            </a:extLst>
+          </p:cNvPr>
+          <p:cNvPicPr>
+            <a:picLocks noChangeAspect="1"/>
+          </p:cNvPicPr>
+          <p:nvPr/>
+        </p:nvPicPr>
+        <p:blipFill>
+          <a:blip r:embed="rId2"/>
+          <a:stretch>
+            <a:fillRect/>
+          </a:stretch>
+        </p:blipFill>
+        <p:spPr>
+          <a:xfrm>
+            <a:off x="843327" y="2039625"/>
+            <a:ext cx="5160295" cy="4186544"/>
+          </a:xfrm>
+          <a:prstGeom prst="rect">
+            <a:avLst/>
+          </a:prstGeom>
+        </p:spPr>
+      </p:pic>
+      <p:sp>
+        <p:nvSpPr>
+          <p:cNvPr id="9" name="Rechteck 8">
+            <a:extLst>
+              <a:ext uri="{FF2B5EF4-FFF2-40B4-BE49-F238E27FC236}">
+                <a16:creationId xmlns:a16="http://schemas.microsoft.com/office/drawing/2014/main" id="{88C76C34-CAC4-4BD8-B936-D173168B5BFC}"/>
+              </a:ext>
+            </a:extLst>
+          </p:cNvPr>
+          <p:cNvSpPr/>
+          <p:nvPr/>
+        </p:nvSpPr>
+        <p:spPr>
+          <a:xfrm>
+            <a:off x="5296014" y="5917723"/>
+            <a:ext cx="892366" cy="351317"/>
+          </a:xfrm>
+          <a:prstGeom prst="rect">
+            <a:avLst/>
+          </a:prstGeom>
+          <a:noFill/>
+          <a:ln w="28575">
+            <a:solidFill>
+              <a:schemeClr val="accent1"/>
+            </a:solidFill>
+          </a:ln>
+        </p:spPr>
+        <p:style>
+          <a:lnRef idx="2">
+            <a:schemeClr val="accent1">
+              <a:shade val="50000"/>
+            </a:schemeClr>
+          </a:lnRef>
+          <a:fillRef idx="1">
+            <a:schemeClr val="accent1"/>
+          </a:fillRef>
+          <a:effectRef idx="0">
+            <a:schemeClr val="accent1"/>
+          </a:effectRef>
+          <a:fontRef idx="minor">
+            <a:schemeClr val="lt1"/>
+          </a:fontRef>
+        </p:style>
+        <p:txBody>
+          <a:bodyPr rtlCol="0" anchor="ctr"/>
+          <a:lstStyle/>
+          <a:p>
+            <a:pPr algn="ctr"/>
+            <a:endParaRPr lang="de-DE"/>
+          </a:p>
+        </p:txBody>
+      </p:sp>
+    </p:spTree>
+    <p:extLst>
+      <p:ext uri="{BB962C8B-B14F-4D97-AF65-F5344CB8AC3E}">
+        <p14:creationId xmlns:p14="http://schemas.microsoft.com/office/powerpoint/2010/main" val="2478444885"/>
+      </p:ext>
+    </p:extLst>
+  </p:cSld>
+  <p:clrMapOvr>
+    <a:masterClrMapping/>
+  </p:clrMapOvr>
+</p:sld>
+</file>
+
+<file path=ppt/slides/slide44.xml><?xml version="1.0" encoding="utf-8"?>
+<p:sld xmlns:a="http://schemas.openxmlformats.org/drawingml/2006/main" xmlns:r="http://schemas.openxmlformats.org/officeDocument/2006/relationships" xmlns:p="http://schemas.openxmlformats.org/presentationml/2006/main">
+  <p:cSld>
+    <p:spTree>
+      <p:nvGrpSpPr>
+        <p:cNvPr id="1" name=""/>
+        <p:cNvGrpSpPr/>
+        <p:nvPr/>
+      </p:nvGrpSpPr>
+      <p:grpSpPr>
+        <a:xfrm>
+          <a:off x="0" y="0"/>
+          <a:ext cx="0" cy="0"/>
+          <a:chOff x="0" y="0"/>
+          <a:chExt cx="0" cy="0"/>
+        </a:xfrm>
+      </p:grpSpPr>
+      <p:sp>
+        <p:nvSpPr>
+          <p:cNvPr id="2" name="Titel 1">
+            <a:extLst>
+              <a:ext uri="{FF2B5EF4-FFF2-40B4-BE49-F238E27FC236}">
+                <a16:creationId xmlns:a16="http://schemas.microsoft.com/office/drawing/2014/main" id="{AF572405-AA93-48E2-9758-0D6D454B650C}"/>
+              </a:ext>
+            </a:extLst>
+          </p:cNvPr>
+          <p:cNvSpPr>
+            <a:spLocks noGrp="1"/>
+          </p:cNvSpPr>
+          <p:nvPr>
+            <p:ph type="title"/>
+          </p:nvPr>
+        </p:nvSpPr>
+        <p:spPr/>
+        <p:txBody>
+          <a:bodyPr/>
+          <a:lstStyle/>
+          <a:p>
+            <a:r>
+              <a:rPr lang="de-DE" dirty="0"/>
+              <a:t>Virtuelles Gerät anlegen</a:t>
+            </a:r>
+          </a:p>
+        </p:txBody>
+      </p:sp>
+      <p:sp>
+        <p:nvSpPr>
+          <p:cNvPr id="3" name="Inhaltsplatzhalter 2">
+            <a:extLst>
+              <a:ext uri="{FF2B5EF4-FFF2-40B4-BE49-F238E27FC236}">
+                <a16:creationId xmlns:a16="http://schemas.microsoft.com/office/drawing/2014/main" id="{2913F135-B601-4351-9038-4D1EABF29085}"/>
+              </a:ext>
+            </a:extLst>
+          </p:cNvPr>
+          <p:cNvSpPr>
+            <a:spLocks noGrp="1"/>
+          </p:cNvSpPr>
+          <p:nvPr>
+            <p:ph idx="1"/>
+          </p:nvPr>
+        </p:nvSpPr>
+        <p:spPr/>
+        <p:txBody>
+          <a:bodyPr/>
+          <a:lstStyle/>
+          <a:p>
+            <a:r>
+              <a:rPr lang="de-DE" dirty="0"/>
+              <a:t>Das emulierte Gerät ist jetzt verfügbar</a:t>
+            </a:r>
+          </a:p>
+        </p:txBody>
+      </p:sp>
+      <p:sp>
+        <p:nvSpPr>
+          <p:cNvPr id="4" name="Datumsplatzhalter 3">
+            <a:extLst>
+              <a:ext uri="{FF2B5EF4-FFF2-40B4-BE49-F238E27FC236}">
+                <a16:creationId xmlns:a16="http://schemas.microsoft.com/office/drawing/2014/main" id="{32193F0A-F504-41E3-BBBF-FAF230DD5913}"/>
+              </a:ext>
+            </a:extLst>
+          </p:cNvPr>
+          <p:cNvSpPr>
+            <a:spLocks noGrp="1"/>
+          </p:cNvSpPr>
+          <p:nvPr>
+            <p:ph type="dt" sz="half" idx="10"/>
+          </p:nvPr>
+        </p:nvSpPr>
+        <p:spPr/>
+        <p:txBody>
+          <a:bodyPr/>
+          <a:lstStyle/>
+          <a:p>
+            <a:fld id="{DAFA5E08-56C4-4D00-93E8-8E8047A8DE89}" type="datetime1">
+              <a:rPr lang="de-DE" smtClean="0"/>
+              <a:t>30.09.2021</a:t>
+            </a:fld>
+            <a:endParaRPr lang="de-DE"/>
+          </a:p>
+        </p:txBody>
+      </p:sp>
+      <p:sp>
+        <p:nvSpPr>
+          <p:cNvPr id="5" name="Fußzeilenplatzhalter 4">
+            <a:extLst>
+              <a:ext uri="{FF2B5EF4-FFF2-40B4-BE49-F238E27FC236}">
+                <a16:creationId xmlns:a16="http://schemas.microsoft.com/office/drawing/2014/main" id="{AD59E32A-93AB-450A-9118-23BB44B6536B}"/>
+              </a:ext>
+            </a:extLst>
+          </p:cNvPr>
+          <p:cNvSpPr>
+            <a:spLocks noGrp="1"/>
+          </p:cNvSpPr>
+          <p:nvPr>
+            <p:ph type="ftr" sz="quarter" idx="11"/>
+          </p:nvPr>
+        </p:nvSpPr>
+        <p:spPr/>
+        <p:txBody>
+          <a:bodyPr/>
+          <a:lstStyle/>
+          <a:p>
+            <a:r>
+              <a:rPr lang="de-DE"/>
+              <a:t>Android Studio</a:t>
+            </a:r>
+          </a:p>
+        </p:txBody>
+      </p:sp>
+      <p:sp>
+        <p:nvSpPr>
+          <p:cNvPr id="6" name="Foliennummernplatzhalter 5">
+            <a:extLst>
+              <a:ext uri="{FF2B5EF4-FFF2-40B4-BE49-F238E27FC236}">
+                <a16:creationId xmlns:a16="http://schemas.microsoft.com/office/drawing/2014/main" id="{AE6910A8-6E1B-40DC-9A8B-FF74D1FD6C3C}"/>
+              </a:ext>
+            </a:extLst>
+          </p:cNvPr>
+          <p:cNvSpPr>
+            <a:spLocks noGrp="1"/>
+          </p:cNvSpPr>
+          <p:nvPr>
+            <p:ph type="sldNum" sz="quarter" idx="12"/>
+          </p:nvPr>
+        </p:nvSpPr>
+        <p:spPr/>
+        <p:txBody>
+          <a:bodyPr/>
+          <a:lstStyle/>
+          <a:p>
+            <a:fld id="{3A1F27E2-D58A-4028-9FF2-B12D897F257E}" type="slidenum">
+              <a:rPr lang="de-DE" smtClean="0"/>
+              <a:t>44</a:t>
+            </a:fld>
+            <a:endParaRPr lang="de-DE"/>
+          </a:p>
+        </p:txBody>
+      </p:sp>
+      <p:pic>
+        <p:nvPicPr>
+          <p:cNvPr id="8" name="Grafik 7">
+            <a:extLst>
+              <a:ext uri="{FF2B5EF4-FFF2-40B4-BE49-F238E27FC236}">
+                <a16:creationId xmlns:a16="http://schemas.microsoft.com/office/drawing/2014/main" id="{55C25C56-E080-4F82-AEB0-C8E02E52C5D5}"/>
+              </a:ext>
+            </a:extLst>
+          </p:cNvPr>
+          <p:cNvPicPr>
+            <a:picLocks noChangeAspect="1"/>
+          </p:cNvPicPr>
+          <p:nvPr/>
+        </p:nvPicPr>
+        <p:blipFill>
+          <a:blip r:embed="rId2"/>
+          <a:stretch>
+            <a:fillRect/>
+          </a:stretch>
+        </p:blipFill>
+        <p:spPr>
+          <a:xfrm>
+            <a:off x="838200" y="2223643"/>
+            <a:ext cx="6517734" cy="3735310"/>
+          </a:xfrm>
+          <a:prstGeom prst="rect">
+            <a:avLst/>
+          </a:prstGeom>
+        </p:spPr>
+      </p:pic>
+      <p:sp>
+        <p:nvSpPr>
+          <p:cNvPr id="9" name="Rechteck 8">
+            <a:extLst>
+              <a:ext uri="{FF2B5EF4-FFF2-40B4-BE49-F238E27FC236}">
+                <a16:creationId xmlns:a16="http://schemas.microsoft.com/office/drawing/2014/main" id="{3299AFB2-B8B8-4C19-B0C0-50E338859774}"/>
+              </a:ext>
+            </a:extLst>
+          </p:cNvPr>
+          <p:cNvSpPr/>
+          <p:nvPr/>
+        </p:nvSpPr>
+        <p:spPr>
+          <a:xfrm>
+            <a:off x="6964794" y="2191543"/>
+            <a:ext cx="391140" cy="351317"/>
+          </a:xfrm>
+          <a:prstGeom prst="rect">
+            <a:avLst/>
+          </a:prstGeom>
+          <a:noFill/>
+          <a:ln w="28575">
+            <a:solidFill>
+              <a:schemeClr val="accent1"/>
+            </a:solidFill>
+          </a:ln>
+        </p:spPr>
+        <p:style>
+          <a:lnRef idx="2">
+            <a:schemeClr val="accent1">
+              <a:shade val="50000"/>
+            </a:schemeClr>
+          </a:lnRef>
+          <a:fillRef idx="1">
+            <a:schemeClr val="accent1"/>
+          </a:fillRef>
+          <a:effectRef idx="0">
+            <a:schemeClr val="accent1"/>
+          </a:effectRef>
+          <a:fontRef idx="minor">
+            <a:schemeClr val="lt1"/>
+          </a:fontRef>
+        </p:style>
+        <p:txBody>
+          <a:bodyPr rtlCol="0" anchor="ctr"/>
+          <a:lstStyle/>
+          <a:p>
+            <a:pPr algn="ctr"/>
+            <a:endParaRPr lang="de-DE"/>
+          </a:p>
+        </p:txBody>
+      </p:sp>
+    </p:spTree>
+    <p:extLst>
+      <p:ext uri="{BB962C8B-B14F-4D97-AF65-F5344CB8AC3E}">
+        <p14:creationId xmlns:p14="http://schemas.microsoft.com/office/powerpoint/2010/main" val="1954024550"/>
+      </p:ext>
+    </p:extLst>
+  </p:cSld>
+  <p:clrMapOvr>
+    <a:masterClrMapping/>
+  </p:clrMapOvr>
+</p:sld>
+</file>
+
+<file path=ppt/slides/slide45.xml><?xml version="1.0" encoding="utf-8"?>
+<p:sld xmlns:a="http://schemas.openxmlformats.org/drawingml/2006/main" xmlns:r="http://schemas.openxmlformats.org/officeDocument/2006/relationships" xmlns:p="http://schemas.openxmlformats.org/presentationml/2006/main">
+  <p:cSld>
+    <p:spTree>
+      <p:nvGrpSpPr>
+        <p:cNvPr id="1" name=""/>
+        <p:cNvGrpSpPr/>
+        <p:nvPr/>
+      </p:nvGrpSpPr>
+      <p:grpSpPr>
+        <a:xfrm>
+          <a:off x="0" y="0"/>
+          <a:ext cx="0" cy="0"/>
+          <a:chOff x="0" y="0"/>
+          <a:chExt cx="0" cy="0"/>
+        </a:xfrm>
+      </p:grpSpPr>
+      <p:sp>
+        <p:nvSpPr>
+          <p:cNvPr id="2" name="Titel 1">
+            <a:extLst>
+              <a:ext uri="{FF2B5EF4-FFF2-40B4-BE49-F238E27FC236}">
+                <a16:creationId xmlns:a16="http://schemas.microsoft.com/office/drawing/2014/main" id="{AF572405-AA93-48E2-9758-0D6D454B650C}"/>
+              </a:ext>
+            </a:extLst>
+          </p:cNvPr>
+          <p:cNvSpPr>
+            <a:spLocks noGrp="1"/>
+          </p:cNvSpPr>
+          <p:nvPr>
+            <p:ph type="title"/>
+          </p:nvPr>
+        </p:nvSpPr>
+        <p:spPr/>
+        <p:txBody>
+          <a:bodyPr/>
+          <a:lstStyle/>
+          <a:p>
+            <a:r>
+              <a:rPr lang="de-DE" dirty="0"/>
+              <a:t>Virtuelles Gerät anlegen</a:t>
+            </a:r>
+          </a:p>
+        </p:txBody>
+      </p:sp>
+      <p:sp>
+        <p:nvSpPr>
+          <p:cNvPr id="3" name="Inhaltsplatzhalter 2">
+            <a:extLst>
+              <a:ext uri="{FF2B5EF4-FFF2-40B4-BE49-F238E27FC236}">
+                <a16:creationId xmlns:a16="http://schemas.microsoft.com/office/drawing/2014/main" id="{2913F135-B601-4351-9038-4D1EABF29085}"/>
+              </a:ext>
+            </a:extLst>
+          </p:cNvPr>
+          <p:cNvSpPr>
+            <a:spLocks noGrp="1"/>
+          </p:cNvSpPr>
+          <p:nvPr>
+            <p:ph idx="1"/>
+          </p:nvPr>
+        </p:nvSpPr>
+        <p:spPr>
+          <a:xfrm>
+            <a:off x="838201" y="1520825"/>
+            <a:ext cx="6111240" cy="4645025"/>
+          </a:xfrm>
+        </p:spPr>
+        <p:txBody>
+          <a:bodyPr/>
+          <a:lstStyle/>
+          <a:p>
+            <a:r>
+              <a:rPr lang="de-DE" dirty="0"/>
+              <a:t>Liste der Geräte aktualisieren (Refresh)</a:t>
+            </a:r>
+          </a:p>
+          <a:p>
+            <a:r>
+              <a:rPr lang="de-DE" dirty="0"/>
+              <a:t>Gerät auswählen (hier: Pixel 4 API 26)</a:t>
+            </a:r>
+          </a:p>
+          <a:p>
+            <a:r>
+              <a:rPr lang="de-DE" dirty="0"/>
+              <a:t>Wenn der Emulator läuft: Android SDK … ist ausgewählt</a:t>
+            </a:r>
+          </a:p>
+        </p:txBody>
+      </p:sp>
+      <p:sp>
+        <p:nvSpPr>
+          <p:cNvPr id="4" name="Datumsplatzhalter 3">
+            <a:extLst>
+              <a:ext uri="{FF2B5EF4-FFF2-40B4-BE49-F238E27FC236}">
+                <a16:creationId xmlns:a16="http://schemas.microsoft.com/office/drawing/2014/main" id="{32193F0A-F504-41E3-BBBF-FAF230DD5913}"/>
+              </a:ext>
+            </a:extLst>
+          </p:cNvPr>
+          <p:cNvSpPr>
+            <a:spLocks noGrp="1"/>
+          </p:cNvSpPr>
+          <p:nvPr>
+            <p:ph type="dt" sz="half" idx="10"/>
+          </p:nvPr>
+        </p:nvSpPr>
+        <p:spPr/>
+        <p:txBody>
+          <a:bodyPr/>
+          <a:lstStyle/>
+          <a:p>
+            <a:fld id="{DAFA5E08-56C4-4D00-93E8-8E8047A8DE89}" type="datetime1">
+              <a:rPr lang="de-DE" smtClean="0"/>
+              <a:t>30.09.2021</a:t>
+            </a:fld>
+            <a:endParaRPr lang="de-DE"/>
+          </a:p>
+        </p:txBody>
+      </p:sp>
+      <p:sp>
+        <p:nvSpPr>
+          <p:cNvPr id="5" name="Fußzeilenplatzhalter 4">
+            <a:extLst>
+              <a:ext uri="{FF2B5EF4-FFF2-40B4-BE49-F238E27FC236}">
+                <a16:creationId xmlns:a16="http://schemas.microsoft.com/office/drawing/2014/main" id="{AD59E32A-93AB-450A-9118-23BB44B6536B}"/>
+              </a:ext>
+            </a:extLst>
+          </p:cNvPr>
+          <p:cNvSpPr>
+            <a:spLocks noGrp="1"/>
+          </p:cNvSpPr>
+          <p:nvPr>
+            <p:ph type="ftr" sz="quarter" idx="11"/>
+          </p:nvPr>
+        </p:nvSpPr>
+        <p:spPr/>
+        <p:txBody>
+          <a:bodyPr/>
+          <a:lstStyle/>
+          <a:p>
+            <a:r>
+              <a:rPr lang="de-DE"/>
+              <a:t>Android Studio</a:t>
+            </a:r>
+          </a:p>
+        </p:txBody>
+      </p:sp>
+      <p:sp>
+        <p:nvSpPr>
+          <p:cNvPr id="6" name="Foliennummernplatzhalter 5">
+            <a:extLst>
+              <a:ext uri="{FF2B5EF4-FFF2-40B4-BE49-F238E27FC236}">
+                <a16:creationId xmlns:a16="http://schemas.microsoft.com/office/drawing/2014/main" id="{AE6910A8-6E1B-40DC-9A8B-FF74D1FD6C3C}"/>
+              </a:ext>
+            </a:extLst>
+          </p:cNvPr>
+          <p:cNvSpPr>
+            <a:spLocks noGrp="1"/>
+          </p:cNvSpPr>
+          <p:nvPr>
+            <p:ph type="sldNum" sz="quarter" idx="12"/>
+          </p:nvPr>
+        </p:nvSpPr>
+        <p:spPr/>
+        <p:txBody>
+          <a:bodyPr/>
+          <a:lstStyle/>
+          <a:p>
+            <a:fld id="{3A1F27E2-D58A-4028-9FF2-B12D897F257E}" type="slidenum">
+              <a:rPr lang="de-DE" smtClean="0"/>
+              <a:t>45</a:t>
+            </a:fld>
+            <a:endParaRPr lang="de-DE"/>
+          </a:p>
+        </p:txBody>
+      </p:sp>
+      <p:pic>
+        <p:nvPicPr>
+          <p:cNvPr id="10" name="Grafik 9">
+            <a:extLst>
+              <a:ext uri="{FF2B5EF4-FFF2-40B4-BE49-F238E27FC236}">
+                <a16:creationId xmlns:a16="http://schemas.microsoft.com/office/drawing/2014/main" id="{5E0F97A0-73E6-4660-9F17-4876A90E3B8D}"/>
+              </a:ext>
+            </a:extLst>
+          </p:cNvPr>
+          <p:cNvPicPr>
+            <a:picLocks noChangeAspect="1"/>
+          </p:cNvPicPr>
+          <p:nvPr/>
+        </p:nvPicPr>
+        <p:blipFill>
+          <a:blip r:embed="rId2"/>
+          <a:stretch>
+            <a:fillRect/>
+          </a:stretch>
+        </p:blipFill>
+        <p:spPr>
+          <a:xfrm>
+            <a:off x="1037243" y="3829843"/>
+            <a:ext cx="4859714" cy="1753309"/>
+          </a:xfrm>
+          <a:prstGeom prst="rect">
+            <a:avLst/>
+          </a:prstGeom>
+        </p:spPr>
+      </p:pic>
+      <p:sp>
+        <p:nvSpPr>
+          <p:cNvPr id="9" name="Rechteck 8">
+            <a:extLst>
+              <a:ext uri="{FF2B5EF4-FFF2-40B4-BE49-F238E27FC236}">
+                <a16:creationId xmlns:a16="http://schemas.microsoft.com/office/drawing/2014/main" id="{3299AFB2-B8B8-4C19-B0C0-50E338859774}"/>
+              </a:ext>
+            </a:extLst>
+          </p:cNvPr>
+          <p:cNvSpPr/>
+          <p:nvPr/>
+        </p:nvSpPr>
+        <p:spPr>
+          <a:xfrm>
+            <a:off x="1333614" y="5231835"/>
+            <a:ext cx="708546" cy="351317"/>
+          </a:xfrm>
+          <a:prstGeom prst="rect">
+            <a:avLst/>
+          </a:prstGeom>
+          <a:noFill/>
+          <a:ln w="28575">
+            <a:solidFill>
+              <a:schemeClr val="accent1"/>
+            </a:solidFill>
+          </a:ln>
+        </p:spPr>
+        <p:style>
+          <a:lnRef idx="2">
+            <a:schemeClr val="accent1">
+              <a:shade val="50000"/>
+            </a:schemeClr>
+          </a:lnRef>
+          <a:fillRef idx="1">
+            <a:schemeClr val="accent1"/>
+          </a:fillRef>
+          <a:effectRef idx="0">
+            <a:schemeClr val="accent1"/>
+          </a:effectRef>
+          <a:fontRef idx="minor">
+            <a:schemeClr val="lt1"/>
+          </a:fontRef>
+        </p:style>
+        <p:txBody>
+          <a:bodyPr rtlCol="0" anchor="ctr"/>
+          <a:lstStyle/>
+          <a:p>
+            <a:pPr algn="ctr"/>
+            <a:endParaRPr lang="de-DE"/>
+          </a:p>
+        </p:txBody>
+      </p:sp>
+      <p:sp>
+        <p:nvSpPr>
+          <p:cNvPr id="11" name="Rechteck 10">
+            <a:extLst>
+              <a:ext uri="{FF2B5EF4-FFF2-40B4-BE49-F238E27FC236}">
+                <a16:creationId xmlns:a16="http://schemas.microsoft.com/office/drawing/2014/main" id="{75005434-A059-4AEA-B2EC-7B2735A94F9C}"/>
+              </a:ext>
+            </a:extLst>
+          </p:cNvPr>
+          <p:cNvSpPr/>
+          <p:nvPr/>
+        </p:nvSpPr>
+        <p:spPr>
+          <a:xfrm>
+            <a:off x="3002394" y="4948156"/>
+            <a:ext cx="1036206" cy="351317"/>
+          </a:xfrm>
+          <a:prstGeom prst="rect">
+            <a:avLst/>
+          </a:prstGeom>
+          <a:noFill/>
+          <a:ln w="28575">
+            <a:solidFill>
+              <a:schemeClr val="accent1"/>
+            </a:solidFill>
+          </a:ln>
+        </p:spPr>
+        <p:style>
+          <a:lnRef idx="2">
+            <a:schemeClr val="accent1">
+              <a:shade val="50000"/>
+            </a:schemeClr>
+          </a:lnRef>
+          <a:fillRef idx="1">
+            <a:schemeClr val="accent1"/>
+          </a:fillRef>
+          <a:effectRef idx="0">
+            <a:schemeClr val="accent1"/>
+          </a:effectRef>
+          <a:fontRef idx="minor">
+            <a:schemeClr val="lt1"/>
+          </a:fontRef>
+        </p:style>
+        <p:txBody>
+          <a:bodyPr rtlCol="0" anchor="ctr"/>
+          <a:lstStyle/>
+          <a:p>
+            <a:pPr algn="ctr"/>
+            <a:endParaRPr lang="de-DE"/>
+          </a:p>
+        </p:txBody>
+      </p:sp>
+      <p:sp>
+        <p:nvSpPr>
+          <p:cNvPr id="12" name="Rechteck 11">
+            <a:extLst>
+              <a:ext uri="{FF2B5EF4-FFF2-40B4-BE49-F238E27FC236}">
+                <a16:creationId xmlns:a16="http://schemas.microsoft.com/office/drawing/2014/main" id="{B71BBD8E-75A4-4870-9D92-91EF1167BB28}"/>
+              </a:ext>
+            </a:extLst>
+          </p:cNvPr>
+          <p:cNvSpPr/>
+          <p:nvPr/>
+        </p:nvSpPr>
+        <p:spPr>
+          <a:xfrm>
+            <a:off x="5563582" y="3910097"/>
+            <a:ext cx="333375" cy="351317"/>
+          </a:xfrm>
+          <a:prstGeom prst="rect">
+            <a:avLst/>
+          </a:prstGeom>
+          <a:noFill/>
+          <a:ln w="28575">
+            <a:solidFill>
+              <a:schemeClr val="accent1"/>
+            </a:solidFill>
+          </a:ln>
+        </p:spPr>
+        <p:style>
+          <a:lnRef idx="2">
+            <a:schemeClr val="accent1">
+              <a:shade val="50000"/>
+            </a:schemeClr>
+          </a:lnRef>
+          <a:fillRef idx="1">
+            <a:schemeClr val="accent1"/>
+          </a:fillRef>
+          <a:effectRef idx="0">
+            <a:schemeClr val="accent1"/>
+          </a:effectRef>
+          <a:fontRef idx="minor">
+            <a:schemeClr val="lt1"/>
+          </a:fontRef>
+        </p:style>
+        <p:txBody>
+          <a:bodyPr rtlCol="0" anchor="ctr"/>
+          <a:lstStyle/>
+          <a:p>
+            <a:pPr algn="ctr"/>
+            <a:endParaRPr lang="de-DE"/>
+          </a:p>
+        </p:txBody>
+      </p:sp>
+      <p:pic>
+        <p:nvPicPr>
+          <p:cNvPr id="14" name="Grafik 13">
+            <a:extLst>
+              <a:ext uri="{FF2B5EF4-FFF2-40B4-BE49-F238E27FC236}">
+                <a16:creationId xmlns:a16="http://schemas.microsoft.com/office/drawing/2014/main" id="{72C6601B-51C8-436C-88C9-B067BD5D3005}"/>
+              </a:ext>
+            </a:extLst>
+          </p:cNvPr>
+          <p:cNvPicPr>
+            <a:picLocks noChangeAspect="1"/>
+          </p:cNvPicPr>
+          <p:nvPr/>
+        </p:nvPicPr>
+        <p:blipFill>
+          <a:blip r:embed="rId3"/>
+          <a:stretch>
+            <a:fillRect/>
+          </a:stretch>
+        </p:blipFill>
+        <p:spPr>
+          <a:xfrm>
+            <a:off x="8137257" y="1820658"/>
+            <a:ext cx="2104698" cy="3947160"/>
+          </a:xfrm>
+          <a:prstGeom prst="rect">
+            <a:avLst/>
+          </a:prstGeom>
+        </p:spPr>
+      </p:pic>
+      <p:sp>
+        <p:nvSpPr>
+          <p:cNvPr id="15" name="Textfeld 14">
+            <a:extLst>
+              <a:ext uri="{FF2B5EF4-FFF2-40B4-BE49-F238E27FC236}">
+                <a16:creationId xmlns:a16="http://schemas.microsoft.com/office/drawing/2014/main" id="{5941C7F5-7A09-48BB-87E6-A9F6EB96DBE3}"/>
+              </a:ext>
+            </a:extLst>
+          </p:cNvPr>
+          <p:cNvSpPr txBox="1"/>
+          <p:nvPr/>
+        </p:nvSpPr>
+        <p:spPr>
+          <a:xfrm>
+            <a:off x="1508190" y="5583152"/>
+            <a:ext cx="359394" cy="369332"/>
+          </a:xfrm>
+          <a:prstGeom prst="rect">
+            <a:avLst/>
+          </a:prstGeom>
+          <a:noFill/>
+        </p:spPr>
+        <p:txBody>
+          <a:bodyPr wrap="none" rtlCol="0">
+            <a:spAutoFit/>
+          </a:bodyPr>
+          <a:lstStyle/>
+          <a:p>
+            <a:r>
+              <a:rPr lang="de-DE" dirty="0">
+                <a:solidFill>
+                  <a:schemeClr val="accent1"/>
+                </a:solidFill>
+              </a:rPr>
+              <a:t>1.</a:t>
+            </a:r>
+          </a:p>
+        </p:txBody>
+      </p:sp>
+      <p:sp>
+        <p:nvSpPr>
+          <p:cNvPr id="16" name="Textfeld 15">
+            <a:extLst>
+              <a:ext uri="{FF2B5EF4-FFF2-40B4-BE49-F238E27FC236}">
+                <a16:creationId xmlns:a16="http://schemas.microsoft.com/office/drawing/2014/main" id="{C03CDD47-E9C8-4E06-B500-FBC2A56EA321}"/>
+              </a:ext>
+            </a:extLst>
+          </p:cNvPr>
+          <p:cNvSpPr txBox="1"/>
+          <p:nvPr/>
+        </p:nvSpPr>
+        <p:spPr>
+          <a:xfrm>
+            <a:off x="3363546" y="5222827"/>
+            <a:ext cx="359394" cy="369332"/>
+          </a:xfrm>
+          <a:prstGeom prst="rect">
+            <a:avLst/>
+          </a:prstGeom>
+          <a:noFill/>
+        </p:spPr>
+        <p:txBody>
+          <a:bodyPr wrap="none" rtlCol="0">
+            <a:spAutoFit/>
+          </a:bodyPr>
+          <a:lstStyle/>
+          <a:p>
+            <a:r>
+              <a:rPr lang="de-DE" dirty="0">
+                <a:solidFill>
+                  <a:schemeClr val="accent1"/>
+                </a:solidFill>
+              </a:rPr>
+              <a:t>2.</a:t>
+            </a:r>
+          </a:p>
+        </p:txBody>
+      </p:sp>
+      <p:sp>
+        <p:nvSpPr>
+          <p:cNvPr id="17" name="Textfeld 16">
+            <a:extLst>
+              <a:ext uri="{FF2B5EF4-FFF2-40B4-BE49-F238E27FC236}">
+                <a16:creationId xmlns:a16="http://schemas.microsoft.com/office/drawing/2014/main" id="{204C307E-416F-498B-AE6E-D28662960977}"/>
+              </a:ext>
+            </a:extLst>
+          </p:cNvPr>
+          <p:cNvSpPr txBox="1"/>
+          <p:nvPr/>
+        </p:nvSpPr>
+        <p:spPr>
+          <a:xfrm>
+            <a:off x="5563582" y="4256570"/>
+            <a:ext cx="359394" cy="369332"/>
+          </a:xfrm>
+          <a:prstGeom prst="rect">
+            <a:avLst/>
+          </a:prstGeom>
+          <a:noFill/>
+        </p:spPr>
+        <p:txBody>
+          <a:bodyPr wrap="none" rtlCol="0">
+            <a:spAutoFit/>
+          </a:bodyPr>
+          <a:lstStyle/>
+          <a:p>
+            <a:r>
+              <a:rPr lang="de-DE" dirty="0">
+                <a:solidFill>
+                  <a:schemeClr val="accent1"/>
+                </a:solidFill>
+              </a:rPr>
+              <a:t>3.</a:t>
+            </a:r>
+          </a:p>
+        </p:txBody>
+      </p:sp>
+      <p:sp>
+        <p:nvSpPr>
+          <p:cNvPr id="18" name="Rechteck 17">
+            <a:extLst>
+              <a:ext uri="{FF2B5EF4-FFF2-40B4-BE49-F238E27FC236}">
+                <a16:creationId xmlns:a16="http://schemas.microsoft.com/office/drawing/2014/main" id="{90DC0F51-266D-42A5-9CCD-54BF331636BF}"/>
+              </a:ext>
+            </a:extLst>
+          </p:cNvPr>
+          <p:cNvSpPr/>
+          <p:nvPr/>
+        </p:nvSpPr>
+        <p:spPr>
+          <a:xfrm>
+            <a:off x="9954300" y="1820658"/>
+            <a:ext cx="333375" cy="351317"/>
+          </a:xfrm>
+          <a:prstGeom prst="rect">
+            <a:avLst/>
+          </a:prstGeom>
+          <a:noFill/>
+          <a:ln w="28575">
+            <a:solidFill>
+              <a:schemeClr val="accent1"/>
+            </a:solidFill>
+          </a:ln>
+        </p:spPr>
+        <p:style>
+          <a:lnRef idx="2">
+            <a:schemeClr val="accent1">
+              <a:shade val="50000"/>
+            </a:schemeClr>
+          </a:lnRef>
+          <a:fillRef idx="1">
+            <a:schemeClr val="accent1"/>
+          </a:fillRef>
+          <a:effectRef idx="0">
+            <a:schemeClr val="accent1"/>
+          </a:effectRef>
+          <a:fontRef idx="minor">
+            <a:schemeClr val="lt1"/>
+          </a:fontRef>
+        </p:style>
+        <p:txBody>
+          <a:bodyPr rtlCol="0" anchor="ctr"/>
+          <a:lstStyle/>
+          <a:p>
+            <a:pPr algn="ctr"/>
+            <a:endParaRPr lang="de-DE"/>
+          </a:p>
+        </p:txBody>
+      </p:sp>
+      <p:sp>
+        <p:nvSpPr>
+          <p:cNvPr id="19" name="Textfeld 18">
+            <a:extLst>
+              <a:ext uri="{FF2B5EF4-FFF2-40B4-BE49-F238E27FC236}">
+                <a16:creationId xmlns:a16="http://schemas.microsoft.com/office/drawing/2014/main" id="{DF6EA910-19EA-49FA-AAB9-3B5B3BC1CAD5}"/>
+              </a:ext>
+            </a:extLst>
+          </p:cNvPr>
+          <p:cNvSpPr txBox="1"/>
+          <p:nvPr/>
+        </p:nvSpPr>
+        <p:spPr>
+          <a:xfrm>
+            <a:off x="10286881" y="1820658"/>
+            <a:ext cx="359394" cy="369332"/>
+          </a:xfrm>
+          <a:prstGeom prst="rect">
+            <a:avLst/>
+          </a:prstGeom>
+          <a:noFill/>
+        </p:spPr>
+        <p:txBody>
+          <a:bodyPr wrap="none" rtlCol="0">
+            <a:spAutoFit/>
+          </a:bodyPr>
+          <a:lstStyle/>
+          <a:p>
+            <a:r>
+              <a:rPr lang="de-DE" dirty="0">
+                <a:solidFill>
+                  <a:schemeClr val="accent1"/>
+                </a:solidFill>
+              </a:rPr>
+              <a:t>4.</a:t>
+            </a:r>
+          </a:p>
+        </p:txBody>
+      </p:sp>
+      <p:sp>
+        <p:nvSpPr>
+          <p:cNvPr id="20" name="Textfeld 19">
+            <a:extLst>
+              <a:ext uri="{FF2B5EF4-FFF2-40B4-BE49-F238E27FC236}">
+                <a16:creationId xmlns:a16="http://schemas.microsoft.com/office/drawing/2014/main" id="{0A6EF321-A884-4ADA-91F7-BC1F6EC855AA}"/>
+              </a:ext>
+            </a:extLst>
+          </p:cNvPr>
+          <p:cNvSpPr txBox="1"/>
+          <p:nvPr/>
+        </p:nvSpPr>
+        <p:spPr>
+          <a:xfrm>
+            <a:off x="10286881" y="2189990"/>
+            <a:ext cx="1589218" cy="646331"/>
+          </a:xfrm>
+          <a:prstGeom prst="rect">
+            <a:avLst/>
+          </a:prstGeom>
+          <a:noFill/>
+        </p:spPr>
+        <p:txBody>
+          <a:bodyPr wrap="none" rtlCol="0">
+            <a:spAutoFit/>
+          </a:bodyPr>
+          <a:lstStyle/>
+          <a:p>
+            <a:r>
+              <a:rPr lang="de-DE" dirty="0"/>
+              <a:t>falls Bildschirm</a:t>
+            </a:r>
+          </a:p>
+          <a:p>
+            <a:r>
+              <a:rPr lang="de-DE" dirty="0"/>
+              <a:t>Schwarz bleibt</a:t>
+            </a:r>
+          </a:p>
+        </p:txBody>
+      </p:sp>
+    </p:spTree>
+    <p:extLst>
+      <p:ext uri="{BB962C8B-B14F-4D97-AF65-F5344CB8AC3E}">
+        <p14:creationId xmlns:p14="http://schemas.microsoft.com/office/powerpoint/2010/main" val="1867385574"/>
+      </p:ext>
+    </p:extLst>
+  </p:cSld>
+  <p:clrMapOvr>
+    <a:masterClrMapping/>
+  </p:clrMapOvr>
+</p:sld>
+</file>
+
+<file path=ppt/slides/slide46.xml><?xml version="1.0" encoding="utf-8"?>
+<p:sld xmlns:a="http://schemas.openxmlformats.org/drawingml/2006/main" xmlns:r="http://schemas.openxmlformats.org/officeDocument/2006/relationships" xmlns:p="http://schemas.openxmlformats.org/presentationml/2006/main" show="0">
+  <p:cSld>
+    <p:spTree>
+      <p:nvGrpSpPr>
+        <p:cNvPr id="1" name=""/>
+        <p:cNvGrpSpPr/>
+        <p:nvPr/>
+      </p:nvGrpSpPr>
+      <p:grpSpPr>
+        <a:xfrm>
+          <a:off x="0" y="0"/>
+          <a:ext cx="0" cy="0"/>
+          <a:chOff x="0" y="0"/>
+          <a:chExt cx="0" cy="0"/>
+        </a:xfrm>
+      </p:grpSpPr>
+      <p:sp>
+        <p:nvSpPr>
+          <p:cNvPr id="2" name="Titel 1">
+            <a:extLst>
+              <a:ext uri="{FF2B5EF4-FFF2-40B4-BE49-F238E27FC236}">
+                <a16:creationId xmlns:a16="http://schemas.microsoft.com/office/drawing/2014/main" id="{CC75B289-7CB6-4F77-A9BE-2DD7573CA67A}"/>
+              </a:ext>
+            </a:extLst>
+          </p:cNvPr>
+          <p:cNvSpPr>
+            <a:spLocks noGrp="1"/>
+          </p:cNvSpPr>
+          <p:nvPr>
+            <p:ph type="title"/>
+          </p:nvPr>
+        </p:nvSpPr>
+        <p:spPr/>
+        <p:txBody>
+          <a:bodyPr/>
+          <a:lstStyle/>
+          <a:p>
+            <a:r>
+              <a:rPr lang="de-DE" dirty="0"/>
+              <a:t>Virtuelles Gerät anlegen (offline)</a:t>
+            </a:r>
+          </a:p>
+        </p:txBody>
+      </p:sp>
+      <p:sp>
+        <p:nvSpPr>
+          <p:cNvPr id="3" name="Inhaltsplatzhalter 2">
+            <a:extLst>
+              <a:ext uri="{FF2B5EF4-FFF2-40B4-BE49-F238E27FC236}">
+                <a16:creationId xmlns:a16="http://schemas.microsoft.com/office/drawing/2014/main" id="{561B6C4E-B3BA-4ACF-9628-23EA18DDE36D}"/>
+              </a:ext>
+            </a:extLst>
+          </p:cNvPr>
+          <p:cNvSpPr>
+            <a:spLocks noGrp="1"/>
+          </p:cNvSpPr>
+          <p:nvPr>
+            <p:ph idx="1"/>
+          </p:nvPr>
+        </p:nvSpPr>
+        <p:spPr/>
+        <p:txBody>
+          <a:bodyPr/>
+          <a:lstStyle/>
+          <a:p>
+            <a:endParaRPr lang="de-DE"/>
+          </a:p>
+        </p:txBody>
+      </p:sp>
+      <p:sp>
+        <p:nvSpPr>
+          <p:cNvPr id="4" name="Datumsplatzhalter 3">
+            <a:extLst>
+              <a:ext uri="{FF2B5EF4-FFF2-40B4-BE49-F238E27FC236}">
+                <a16:creationId xmlns:a16="http://schemas.microsoft.com/office/drawing/2014/main" id="{426139B0-D4F3-4F19-AA56-9FA59B918BE4}"/>
+              </a:ext>
+            </a:extLst>
+          </p:cNvPr>
+          <p:cNvSpPr>
+            <a:spLocks noGrp="1"/>
+          </p:cNvSpPr>
+          <p:nvPr>
+            <p:ph type="dt" sz="half" idx="10"/>
+          </p:nvPr>
+        </p:nvSpPr>
+        <p:spPr/>
+        <p:txBody>
+          <a:bodyPr/>
+          <a:lstStyle/>
+          <a:p>
+            <a:fld id="{DAFA5E08-56C4-4D00-93E8-8E8047A8DE89}" type="datetime1">
+              <a:rPr lang="de-DE" smtClean="0"/>
+              <a:t>30.09.2021</a:t>
+            </a:fld>
+            <a:endParaRPr lang="de-DE"/>
+          </a:p>
+        </p:txBody>
+      </p:sp>
+      <p:sp>
+        <p:nvSpPr>
+          <p:cNvPr id="5" name="Fußzeilenplatzhalter 4">
+            <a:extLst>
+              <a:ext uri="{FF2B5EF4-FFF2-40B4-BE49-F238E27FC236}">
+                <a16:creationId xmlns:a16="http://schemas.microsoft.com/office/drawing/2014/main" id="{365CD957-E03C-4D38-AFFB-323A1554F4D9}"/>
+              </a:ext>
+            </a:extLst>
+          </p:cNvPr>
+          <p:cNvSpPr>
+            <a:spLocks noGrp="1"/>
+          </p:cNvSpPr>
+          <p:nvPr>
+            <p:ph type="ftr" sz="quarter" idx="11"/>
+          </p:nvPr>
+        </p:nvSpPr>
+        <p:spPr/>
+        <p:txBody>
+          <a:bodyPr/>
+          <a:lstStyle/>
+          <a:p>
+            <a:r>
+              <a:rPr lang="de-DE"/>
+              <a:t>Android Studio</a:t>
+            </a:r>
+          </a:p>
+        </p:txBody>
+      </p:sp>
+      <p:sp>
+        <p:nvSpPr>
+          <p:cNvPr id="6" name="Foliennummernplatzhalter 5">
+            <a:extLst>
+              <a:ext uri="{FF2B5EF4-FFF2-40B4-BE49-F238E27FC236}">
+                <a16:creationId xmlns:a16="http://schemas.microsoft.com/office/drawing/2014/main" id="{2FA0442F-79CD-403C-8A0E-F33F7ABFE99B}"/>
+              </a:ext>
+            </a:extLst>
+          </p:cNvPr>
+          <p:cNvSpPr>
+            <a:spLocks noGrp="1"/>
+          </p:cNvSpPr>
+          <p:nvPr>
+            <p:ph type="sldNum" sz="quarter" idx="12"/>
+          </p:nvPr>
+        </p:nvSpPr>
+        <p:spPr/>
+        <p:txBody>
+          <a:bodyPr/>
+          <a:lstStyle/>
+          <a:p>
+            <a:fld id="{3A1F27E2-D58A-4028-9FF2-B12D897F257E}" type="slidenum">
+              <a:rPr lang="de-DE" smtClean="0"/>
+              <a:t>46</a:t>
+            </a:fld>
+            <a:endParaRPr lang="de-DE"/>
+          </a:p>
+        </p:txBody>
+      </p:sp>
+    </p:spTree>
+    <p:extLst>
+      <p:ext uri="{BB962C8B-B14F-4D97-AF65-F5344CB8AC3E}">
+        <p14:creationId xmlns:p14="http://schemas.microsoft.com/office/powerpoint/2010/main" val="3534220690"/>
+      </p:ext>
+    </p:extLst>
+  </p:cSld>
+  <p:clrMapOvr>
+    <a:masterClrMapping/>
+  </p:clrMapOvr>
+</p:sld>
+</file>
+
+<file path=ppt/slides/slide47.xml><?xml version="1.0" encoding="utf-8"?>
+<p:sld xmlns:a="http://schemas.openxmlformats.org/drawingml/2006/main" xmlns:r="http://schemas.openxmlformats.org/officeDocument/2006/relationships" xmlns:p="http://schemas.openxmlformats.org/presentationml/2006/main">
+  <p:cSld>
+    <p:spTree>
+      <p:nvGrpSpPr>
+        <p:cNvPr id="1" name=""/>
+        <p:cNvGrpSpPr/>
+        <p:nvPr/>
+      </p:nvGrpSpPr>
+      <p:grpSpPr>
+        <a:xfrm>
+          <a:off x="0" y="0"/>
+          <a:ext cx="0" cy="0"/>
+          <a:chOff x="0" y="0"/>
+          <a:chExt cx="0" cy="0"/>
+        </a:xfrm>
+      </p:grpSpPr>
+      <p:sp>
+        <p:nvSpPr>
+          <p:cNvPr id="4" name="Titel 3"/>
+          <p:cNvSpPr>
+            <a:spLocks noGrp="1"/>
+          </p:cNvSpPr>
+          <p:nvPr>
+            <p:ph type="title"/>
+          </p:nvPr>
+        </p:nvSpPr>
+        <p:spPr/>
+        <p:txBody>
+          <a:bodyPr/>
+          <a:lstStyle/>
+          <a:p>
+            <a:r>
+              <a:rPr lang="de-DE" dirty="0"/>
+              <a:t>Zusammenfassung</a:t>
+            </a:r>
+          </a:p>
+        </p:txBody>
+      </p:sp>
+      <p:sp>
+        <p:nvSpPr>
+          <p:cNvPr id="5" name="Inhaltsplatzhalter 4"/>
+          <p:cNvSpPr>
+            <a:spLocks noGrp="1"/>
+          </p:cNvSpPr>
+          <p:nvPr>
+            <p:ph idx="1"/>
+          </p:nvPr>
+        </p:nvSpPr>
+        <p:spPr/>
+        <p:txBody>
+          <a:bodyPr/>
+          <a:lstStyle/>
+          <a:p>
+            <a:r>
+              <a:rPr lang="de-DE" dirty="0"/>
+              <a:t>Das erstmalige Einrichten einer Entwicklungsumgebung kann aufwändig sein</a:t>
+            </a:r>
+          </a:p>
+          <a:p>
+            <a:endParaRPr lang="de-DE" dirty="0"/>
+          </a:p>
+          <a:p>
+            <a:r>
+              <a:rPr lang="de-DE" dirty="0"/>
+              <a:t>Zum Programmieren braucht man eher einen ordentlichen PC</a:t>
+            </a:r>
+          </a:p>
+          <a:p>
+            <a:pPr lvl="1"/>
+            <a:r>
+              <a:rPr lang="de-DE" dirty="0"/>
+              <a:t>Genug Speicherplatz</a:t>
+            </a:r>
+          </a:p>
+          <a:p>
+            <a:pPr lvl="1"/>
+            <a:r>
+              <a:rPr lang="de-DE" dirty="0"/>
+              <a:t>Genug Rechenleistung</a:t>
+            </a:r>
+          </a:p>
+          <a:p>
+            <a:pPr lvl="1"/>
+            <a:endParaRPr lang="de-DE" dirty="0"/>
+          </a:p>
+          <a:p>
+            <a:r>
+              <a:rPr lang="de-DE" dirty="0"/>
+              <a:t>Wir haben alles soweit vorbereitet, dass wir jetzt mit dem Programmieren loslegen und die Sprache Dart erlernen können.</a:t>
+            </a:r>
+          </a:p>
+        </p:txBody>
+      </p:sp>
+      <p:sp>
+        <p:nvSpPr>
+          <p:cNvPr id="2" name="Datumsplatzhalter 1"/>
+          <p:cNvSpPr>
+            <a:spLocks noGrp="1"/>
+          </p:cNvSpPr>
+          <p:nvPr>
+            <p:ph type="dt" sz="half" idx="10"/>
+          </p:nvPr>
+        </p:nvSpPr>
+        <p:spPr/>
+        <p:txBody>
+          <a:bodyPr/>
+          <a:lstStyle/>
+          <a:p>
+            <a:fld id="{89ACDE42-010D-4487-A37F-627E4B397EF3}" type="datetime1">
+              <a:rPr lang="de-DE" smtClean="0"/>
+              <a:t>30.09.2021</a:t>
+            </a:fld>
+            <a:endParaRPr lang="de-DE"/>
+          </a:p>
+        </p:txBody>
+      </p:sp>
+      <p:sp>
+        <p:nvSpPr>
+          <p:cNvPr id="3" name="Fußzeilenplatzhalter 2"/>
+          <p:cNvSpPr>
+            <a:spLocks noGrp="1"/>
+          </p:cNvSpPr>
+          <p:nvPr>
+            <p:ph type="ftr" sz="quarter" idx="11"/>
+          </p:nvPr>
+        </p:nvSpPr>
+        <p:spPr/>
+        <p:txBody>
+          <a:bodyPr/>
+          <a:lstStyle/>
+          <a:p>
+            <a:r>
+              <a:rPr lang="de-DE"/>
+              <a:t>Android Studio</a:t>
+            </a:r>
+          </a:p>
+        </p:txBody>
+      </p:sp>
+      <p:sp>
+        <p:nvSpPr>
+          <p:cNvPr id="6" name="Foliennummernplatzhalter 5"/>
+          <p:cNvSpPr>
+            <a:spLocks noGrp="1"/>
+          </p:cNvSpPr>
+          <p:nvPr>
+            <p:ph type="sldNum" sz="quarter" idx="12"/>
+          </p:nvPr>
+        </p:nvSpPr>
+        <p:spPr/>
+        <p:txBody>
+          <a:bodyPr/>
+          <a:lstStyle/>
+          <a:p>
+            <a:fld id="{3A1F27E2-D58A-4028-9FF2-B12D897F257E}" type="slidenum">
+              <a:rPr lang="de-DE" smtClean="0"/>
+              <a:t>47</a:t>
+            </a:fld>
+            <a:endParaRPr lang="de-DE"/>
+          </a:p>
+        </p:txBody>
+      </p:sp>
+    </p:spTree>
+    <p:extLst>
+      <p:ext uri="{BB962C8B-B14F-4D97-AF65-F5344CB8AC3E}">
+        <p14:creationId xmlns:p14="http://schemas.microsoft.com/office/powerpoint/2010/main" val="2637983416"/>
+      </p:ext>
+    </p:extLst>
+  </p:cSld>
+  <p:clrMapOvr>
+    <a:masterClrMapping/>
+  </p:clrMapOvr>
+</p:sld>
+</file>
+
+<file path=ppt/slides/slide48.xml><?xml version="1.0" encoding="utf-8"?>
+<p:sld xmlns:a="http://schemas.openxmlformats.org/drawingml/2006/main" xmlns:r="http://schemas.openxmlformats.org/officeDocument/2006/relationships" xmlns:p="http://schemas.openxmlformats.org/presentationml/2006/main">
+  <p:cSld>
+    <p:spTree>
+      <p:nvGrpSpPr>
+        <p:cNvPr id="1" name=""/>
+        <p:cNvGrpSpPr/>
+        <p:nvPr/>
+      </p:nvGrpSpPr>
+      <p:grpSpPr>
+        <a:xfrm>
+          <a:off x="0" y="0"/>
+          <a:ext cx="0" cy="0"/>
+          <a:chOff x="0" y="0"/>
+          <a:chExt cx="0" cy="0"/>
+        </a:xfrm>
+      </p:grpSpPr>
+      <p:sp>
+        <p:nvSpPr>
+          <p:cNvPr id="4" name="Titel 3"/>
+          <p:cNvSpPr>
+            <a:spLocks noGrp="1"/>
+          </p:cNvSpPr>
+          <p:nvPr>
+            <p:ph type="title"/>
+          </p:nvPr>
+        </p:nvSpPr>
+        <p:spPr/>
+        <p:txBody>
+          <a:bodyPr/>
+          <a:lstStyle/>
+          <a:p>
+            <a:r>
+              <a:rPr lang="de-DE" dirty="0"/>
+              <a:t>Fragen</a:t>
+            </a:r>
+          </a:p>
+        </p:txBody>
+      </p:sp>
+      <p:sp>
+        <p:nvSpPr>
+          <p:cNvPr id="2" name="Datumsplatzhalter 1"/>
+          <p:cNvSpPr>
+            <a:spLocks noGrp="1"/>
+          </p:cNvSpPr>
+          <p:nvPr>
+            <p:ph type="dt" sz="half" idx="10"/>
+          </p:nvPr>
+        </p:nvSpPr>
+        <p:spPr/>
+        <p:txBody>
+          <a:bodyPr/>
+          <a:lstStyle/>
+          <a:p>
+            <a:fld id="{29F03F87-5FC1-454A-B924-57348B963929}" type="datetime1">
+              <a:rPr lang="de-DE" smtClean="0"/>
+              <a:t>30.09.2021</a:t>
+            </a:fld>
+            <a:endParaRPr lang="de-DE"/>
+          </a:p>
+        </p:txBody>
+      </p:sp>
+      <p:sp>
+        <p:nvSpPr>
+          <p:cNvPr id="3" name="Fußzeilenplatzhalter 2"/>
+          <p:cNvSpPr>
+            <a:spLocks noGrp="1"/>
+          </p:cNvSpPr>
+          <p:nvPr>
+            <p:ph type="ftr" sz="quarter" idx="11"/>
+          </p:nvPr>
+        </p:nvSpPr>
+        <p:spPr/>
+        <p:txBody>
+          <a:bodyPr/>
+          <a:lstStyle/>
+          <a:p>
+            <a:r>
+              <a:rPr lang="de-DE"/>
+              <a:t>Android Studio</a:t>
+            </a:r>
+          </a:p>
+        </p:txBody>
+      </p:sp>
+      <p:sp>
+        <p:nvSpPr>
+          <p:cNvPr id="6" name="Foliennummernplatzhalter 5"/>
+          <p:cNvSpPr>
+            <a:spLocks noGrp="1"/>
+          </p:cNvSpPr>
+          <p:nvPr>
+            <p:ph type="sldNum" sz="quarter" idx="12"/>
+          </p:nvPr>
+        </p:nvSpPr>
+        <p:spPr/>
+        <p:txBody>
+          <a:bodyPr/>
+          <a:lstStyle/>
+          <a:p>
+            <a:fld id="{3A1F27E2-D58A-4028-9FF2-B12D897F257E}" type="slidenum">
+              <a:rPr lang="de-DE" smtClean="0"/>
+              <a:t>48</a:t>
             </a:fld>
             <a:endParaRPr lang="de-DE"/>
           </a:p>
@@ -16712,7 +19656,7 @@
           <a:p>
             <a:fld id="{DAFA5E08-56C4-4D00-93E8-8E8047A8DE89}" type="datetime1">
               <a:rPr lang="de-DE" smtClean="0"/>
-              <a:t>29.09.2021</a:t>
+              <a:t>30.09.2021</a:t>
             </a:fld>
             <a:endParaRPr lang="de-DE"/>
           </a:p>
@@ -17386,7 +20330,7 @@
           <a:p>
             <a:fld id="{83468713-7584-40CF-B812-011DDBE4027E}" type="datetime1">
               <a:rPr lang="de-DE" smtClean="0"/>
-              <a:t>29.09.2021</a:t>
+              <a:t>30.09.2021</a:t>
             </a:fld>
             <a:endParaRPr lang="de-DE"/>
           </a:p>
@@ -17572,7 +20516,7 @@
           <a:p>
             <a:fld id="{DAFA5E08-56C4-4D00-93E8-8E8047A8DE89}" type="datetime1">
               <a:rPr lang="de-DE" smtClean="0"/>
-              <a:t>29.09.2021</a:t>
+              <a:t>30.09.2021</a:t>
             </a:fld>
             <a:endParaRPr lang="de-DE"/>
           </a:p>
@@ -17850,7 +20794,7 @@
           <a:p>
             <a:fld id="{0989FCA3-C01A-4FEF-9059-6150E2C6978D}" type="datetime1">
               <a:rPr lang="de-DE" smtClean="0"/>
-              <a:t>29.09.2021</a:t>
+              <a:t>30.09.2021</a:t>
             </a:fld>
             <a:endParaRPr lang="de-DE"/>
           </a:p>
@@ -18110,7 +21054,7 @@
           <a:p>
             <a:fld id="{DAFA5E08-56C4-4D00-93E8-8E8047A8DE89}" type="datetime1">
               <a:rPr lang="de-DE" smtClean="0"/>
-              <a:t>29.09.2021</a:t>
+              <a:t>30.09.2021</a:t>
             </a:fld>
             <a:endParaRPr lang="de-DE"/>
           </a:p>

</xml_diff>